<commit_message>
Drum mode demo is ready
math.Ceil -> math.Floor(score+0.1)
Make Vsync on when VsyncSwitch is true
Avoid Shake's Duration being overwritten when calculating Roll's Duration
Fix Chart's Duration at Drum mode
Change Dot's Marked type from bool to int: DotNone, DotHit, DotMiss

Make hints bright when at highlight
Add ShakeDrawer and Dancer (!)
op.ColorM.ChangeHSV -> op.ColorM.Scale(1, 1, 1, 0)
Make every judgement rotates a bit

Temporarily introduce DefaultSoundEffects player
Change DotHitWindow from 50 to 25

Make MaxExtraScore shrink when Extra's weight is low: shrinks more when lower
</commit_message>
<xml_diff>
--- a/gosu-ui.pptx
+++ b/gosu-ui.pptx
@@ -214,7 +214,7 @@
           <a:p>
             <a:fld id="{29E79E71-CE1C-407F-A875-4BDA80D256F6}" type="datetimeFigureOut">
               <a:rPr lang="ko-KR" altLang="en-US" smtClean="0"/>
-              <a:t>2022-09-16</a:t>
+              <a:t>2022-09-18</a:t>
             </a:fld>
             <a:endParaRPr lang="ko-KR" altLang="en-US"/>
           </a:p>
@@ -796,7 +796,7 @@
           <a:p>
             <a:fld id="{9A87183D-DD90-4DD0-9571-682C12DD2772}" type="datetimeFigureOut">
               <a:rPr lang="ko-KR" altLang="en-US" smtClean="0"/>
-              <a:t>2022-09-16</a:t>
+              <a:t>2022-09-18</a:t>
             </a:fld>
             <a:endParaRPr lang="ko-KR" altLang="en-US"/>
           </a:p>
@@ -994,7 +994,7 @@
           <a:p>
             <a:fld id="{9A87183D-DD90-4DD0-9571-682C12DD2772}" type="datetimeFigureOut">
               <a:rPr lang="ko-KR" altLang="en-US" smtClean="0"/>
-              <a:t>2022-09-16</a:t>
+              <a:t>2022-09-18</a:t>
             </a:fld>
             <a:endParaRPr lang="ko-KR" altLang="en-US"/>
           </a:p>
@@ -1202,7 +1202,7 @@
           <a:p>
             <a:fld id="{9A87183D-DD90-4DD0-9571-682C12DD2772}" type="datetimeFigureOut">
               <a:rPr lang="ko-KR" altLang="en-US" smtClean="0"/>
-              <a:t>2022-09-16</a:t>
+              <a:t>2022-09-18</a:t>
             </a:fld>
             <a:endParaRPr lang="ko-KR" altLang="en-US"/>
           </a:p>
@@ -1400,7 +1400,7 @@
           <a:p>
             <a:fld id="{9A87183D-DD90-4DD0-9571-682C12DD2772}" type="datetimeFigureOut">
               <a:rPr lang="ko-KR" altLang="en-US" smtClean="0"/>
-              <a:t>2022-09-16</a:t>
+              <a:t>2022-09-18</a:t>
             </a:fld>
             <a:endParaRPr lang="ko-KR" altLang="en-US"/>
           </a:p>
@@ -1675,7 +1675,7 @@
           <a:p>
             <a:fld id="{9A87183D-DD90-4DD0-9571-682C12DD2772}" type="datetimeFigureOut">
               <a:rPr lang="ko-KR" altLang="en-US" smtClean="0"/>
-              <a:t>2022-09-16</a:t>
+              <a:t>2022-09-18</a:t>
             </a:fld>
             <a:endParaRPr lang="ko-KR" altLang="en-US"/>
           </a:p>
@@ -1940,7 +1940,7 @@
           <a:p>
             <a:fld id="{9A87183D-DD90-4DD0-9571-682C12DD2772}" type="datetimeFigureOut">
               <a:rPr lang="ko-KR" altLang="en-US" smtClean="0"/>
-              <a:t>2022-09-16</a:t>
+              <a:t>2022-09-18</a:t>
             </a:fld>
             <a:endParaRPr lang="ko-KR" altLang="en-US"/>
           </a:p>
@@ -2352,7 +2352,7 @@
           <a:p>
             <a:fld id="{9A87183D-DD90-4DD0-9571-682C12DD2772}" type="datetimeFigureOut">
               <a:rPr lang="ko-KR" altLang="en-US" smtClean="0"/>
-              <a:t>2022-09-16</a:t>
+              <a:t>2022-09-18</a:t>
             </a:fld>
             <a:endParaRPr lang="ko-KR" altLang="en-US"/>
           </a:p>
@@ -2493,7 +2493,7 @@
           <a:p>
             <a:fld id="{9A87183D-DD90-4DD0-9571-682C12DD2772}" type="datetimeFigureOut">
               <a:rPr lang="ko-KR" altLang="en-US" smtClean="0"/>
-              <a:t>2022-09-16</a:t>
+              <a:t>2022-09-18</a:t>
             </a:fld>
             <a:endParaRPr lang="ko-KR" altLang="en-US"/>
           </a:p>
@@ -2606,7 +2606,7 @@
           <a:p>
             <a:fld id="{9A87183D-DD90-4DD0-9571-682C12DD2772}" type="datetimeFigureOut">
               <a:rPr lang="ko-KR" altLang="en-US" smtClean="0"/>
-              <a:t>2022-09-16</a:t>
+              <a:t>2022-09-18</a:t>
             </a:fld>
             <a:endParaRPr lang="ko-KR" altLang="en-US"/>
           </a:p>
@@ -2917,7 +2917,7 @@
           <a:p>
             <a:fld id="{9A87183D-DD90-4DD0-9571-682C12DD2772}" type="datetimeFigureOut">
               <a:rPr lang="ko-KR" altLang="en-US" smtClean="0"/>
-              <a:t>2022-09-16</a:t>
+              <a:t>2022-09-18</a:t>
             </a:fld>
             <a:endParaRPr lang="ko-KR" altLang="en-US"/>
           </a:p>
@@ -3205,7 +3205,7 @@
           <a:p>
             <a:fld id="{9A87183D-DD90-4DD0-9571-682C12DD2772}" type="datetimeFigureOut">
               <a:rPr lang="ko-KR" altLang="en-US" smtClean="0"/>
-              <a:t>2022-09-16</a:t>
+              <a:t>2022-09-18</a:t>
             </a:fld>
             <a:endParaRPr lang="ko-KR" altLang="en-US"/>
           </a:p>
@@ -3446,7 +3446,7 @@
           <a:p>
             <a:fld id="{9A87183D-DD90-4DD0-9571-682C12DD2772}" type="datetimeFigureOut">
               <a:rPr lang="ko-KR" altLang="en-US" smtClean="0"/>
-              <a:t>2022-09-16</a:t>
+              <a:t>2022-09-18</a:t>
             </a:fld>
             <a:endParaRPr lang="ko-KR" altLang="en-US"/>
           </a:p>
@@ -14296,6 +14296,73 @@
               <a:t>ScoreLabelBox</a:t>
             </a:r>
             <a:endParaRPr lang="ko-KR" altLang="en-US" dirty="0"/>
+          </a:p>
+        </p:txBody>
+      </p:sp>
+      <p:sp>
+        <p:nvSpPr>
+          <p:cNvPr id="4" name="이등변 삼각형 3">
+            <a:extLst>
+              <a:ext uri="{FF2B5EF4-FFF2-40B4-BE49-F238E27FC236}">
+                <a16:creationId xmlns:a16="http://schemas.microsoft.com/office/drawing/2014/main" id="{EA15AB18-02F0-53D4-A6B8-75F0F2674F15}"/>
+              </a:ext>
+            </a:extLst>
+          </p:cNvPr>
+          <p:cNvSpPr/>
+          <p:nvPr/>
+        </p:nvSpPr>
+        <p:spPr>
+          <a:xfrm rot="5400000">
+            <a:off x="4261160" y="4960058"/>
+            <a:ext cx="252000" cy="252000"/>
+          </a:xfrm>
+          <a:prstGeom prst="triangle">
+            <a:avLst>
+              <a:gd name="adj" fmla="val 40"/>
+            </a:avLst>
+          </a:prstGeom>
+          <a:solidFill>
+            <a:srgbClr val="FFFF00"/>
+          </a:solidFill>
+          <a:ln>
+            <a:solidFill>
+              <a:srgbClr val="002060"/>
+            </a:solidFill>
+          </a:ln>
+        </p:spPr>
+        <p:style>
+          <a:lnRef idx="2">
+            <a:schemeClr val="accent1">
+              <a:shade val="50000"/>
+            </a:schemeClr>
+          </a:lnRef>
+          <a:fillRef idx="1">
+            <a:schemeClr val="accent1"/>
+          </a:fillRef>
+          <a:effectRef idx="0">
+            <a:schemeClr val="accent1"/>
+          </a:effectRef>
+          <a:fontRef idx="minor">
+            <a:schemeClr val="lt1"/>
+          </a:fontRef>
+        </p:style>
+        <p:txBody>
+          <a:bodyPr vert="vert270" lIns="144000" tIns="108000" rIns="108000" rtlCol="0" anchor="ctr"/>
+          <a:lstStyle/>
+          <a:p>
+            <a:r>
+              <a:rPr lang="en-US" altLang="ko-KR" sz="1050" b="1">
+                <a:solidFill>
+                  <a:srgbClr val="7030A0"/>
+                </a:solidFill>
+              </a:rPr>
+              <a:t>4</a:t>
+            </a:r>
+            <a:endParaRPr lang="ko-KR" altLang="en-US" sz="1050" b="1">
+              <a:solidFill>
+                <a:srgbClr val="7030A0"/>
+              </a:solidFill>
+            </a:endParaRPr>
           </a:p>
         </p:txBody>
       </p:sp>

</xml_diff>

<commit_message>
in dev: ChartInfoBoard draft done
Subject: Size(), SetSize(), Draw()
</commit_message>
<xml_diff>
--- a/gosu-ui.pptx
+++ b/gosu-ui.pptx
@@ -5,20 +5,23 @@
     <p:sldMasterId id="2147483648" r:id="rId1"/>
   </p:sldMasterIdLst>
   <p:notesMasterIdLst>
-    <p:notesMasterId r:id="rId13"/>
+    <p:notesMasterId r:id="rId16"/>
   </p:notesMasterIdLst>
   <p:sldIdLst>
     <p:sldId id="259" r:id="rId2"/>
     <p:sldId id="260" r:id="rId3"/>
     <p:sldId id="265" r:id="rId4"/>
     <p:sldId id="271" r:id="rId5"/>
-    <p:sldId id="262" r:id="rId6"/>
-    <p:sldId id="270" r:id="rId7"/>
-    <p:sldId id="261" r:id="rId8"/>
-    <p:sldId id="258" r:id="rId9"/>
-    <p:sldId id="263" r:id="rId10"/>
-    <p:sldId id="267" r:id="rId11"/>
-    <p:sldId id="268" r:id="rId12"/>
+    <p:sldId id="272" r:id="rId6"/>
+    <p:sldId id="274" r:id="rId7"/>
+    <p:sldId id="275" r:id="rId8"/>
+    <p:sldId id="262" r:id="rId9"/>
+    <p:sldId id="270" r:id="rId10"/>
+    <p:sldId id="261" r:id="rId11"/>
+    <p:sldId id="258" r:id="rId12"/>
+    <p:sldId id="263" r:id="rId13"/>
+    <p:sldId id="267" r:id="rId14"/>
+    <p:sldId id="268" r:id="rId15"/>
   </p:sldIdLst>
   <p:sldSz cx="12192000" cy="6858000"/>
   <p:notesSz cx="6858000" cy="9144000"/>
@@ -215,7 +218,7 @@
           <a:p>
             <a:fld id="{29E79E71-CE1C-407F-A875-4BDA80D256F6}" type="datetimeFigureOut">
               <a:rPr lang="ko-KR" altLang="en-US" smtClean="0"/>
-              <a:t>2022-09-24</a:t>
+              <a:t>2022-10-10</a:t>
             </a:fld>
             <a:endParaRPr lang="ko-KR" altLang="en-US"/>
           </a:p>
@@ -881,7 +884,7 @@
           <a:p>
             <a:fld id="{9A87183D-DD90-4DD0-9571-682C12DD2772}" type="datetimeFigureOut">
               <a:rPr lang="ko-KR" altLang="en-US" smtClean="0"/>
-              <a:t>2022-09-24</a:t>
+              <a:t>2022-10-10</a:t>
             </a:fld>
             <a:endParaRPr lang="ko-KR" altLang="en-US"/>
           </a:p>
@@ -1079,7 +1082,7 @@
           <a:p>
             <a:fld id="{9A87183D-DD90-4DD0-9571-682C12DD2772}" type="datetimeFigureOut">
               <a:rPr lang="ko-KR" altLang="en-US" smtClean="0"/>
-              <a:t>2022-09-24</a:t>
+              <a:t>2022-10-10</a:t>
             </a:fld>
             <a:endParaRPr lang="ko-KR" altLang="en-US"/>
           </a:p>
@@ -1287,7 +1290,7 @@
           <a:p>
             <a:fld id="{9A87183D-DD90-4DD0-9571-682C12DD2772}" type="datetimeFigureOut">
               <a:rPr lang="ko-KR" altLang="en-US" smtClean="0"/>
-              <a:t>2022-09-24</a:t>
+              <a:t>2022-10-10</a:t>
             </a:fld>
             <a:endParaRPr lang="ko-KR" altLang="en-US"/>
           </a:p>
@@ -1485,7 +1488,7 @@
           <a:p>
             <a:fld id="{9A87183D-DD90-4DD0-9571-682C12DD2772}" type="datetimeFigureOut">
               <a:rPr lang="ko-KR" altLang="en-US" smtClean="0"/>
-              <a:t>2022-09-24</a:t>
+              <a:t>2022-10-10</a:t>
             </a:fld>
             <a:endParaRPr lang="ko-KR" altLang="en-US"/>
           </a:p>
@@ -1760,7 +1763,7 @@
           <a:p>
             <a:fld id="{9A87183D-DD90-4DD0-9571-682C12DD2772}" type="datetimeFigureOut">
               <a:rPr lang="ko-KR" altLang="en-US" smtClean="0"/>
-              <a:t>2022-09-24</a:t>
+              <a:t>2022-10-10</a:t>
             </a:fld>
             <a:endParaRPr lang="ko-KR" altLang="en-US"/>
           </a:p>
@@ -2025,7 +2028,7 @@
           <a:p>
             <a:fld id="{9A87183D-DD90-4DD0-9571-682C12DD2772}" type="datetimeFigureOut">
               <a:rPr lang="ko-KR" altLang="en-US" smtClean="0"/>
-              <a:t>2022-09-24</a:t>
+              <a:t>2022-10-10</a:t>
             </a:fld>
             <a:endParaRPr lang="ko-KR" altLang="en-US"/>
           </a:p>
@@ -2437,7 +2440,7 @@
           <a:p>
             <a:fld id="{9A87183D-DD90-4DD0-9571-682C12DD2772}" type="datetimeFigureOut">
               <a:rPr lang="ko-KR" altLang="en-US" smtClean="0"/>
-              <a:t>2022-09-24</a:t>
+              <a:t>2022-10-10</a:t>
             </a:fld>
             <a:endParaRPr lang="ko-KR" altLang="en-US"/>
           </a:p>
@@ -2578,7 +2581,7 @@
           <a:p>
             <a:fld id="{9A87183D-DD90-4DD0-9571-682C12DD2772}" type="datetimeFigureOut">
               <a:rPr lang="ko-KR" altLang="en-US" smtClean="0"/>
-              <a:t>2022-09-24</a:t>
+              <a:t>2022-10-10</a:t>
             </a:fld>
             <a:endParaRPr lang="ko-KR" altLang="en-US"/>
           </a:p>
@@ -2691,7 +2694,7 @@
           <a:p>
             <a:fld id="{9A87183D-DD90-4DD0-9571-682C12DD2772}" type="datetimeFigureOut">
               <a:rPr lang="ko-KR" altLang="en-US" smtClean="0"/>
-              <a:t>2022-09-24</a:t>
+              <a:t>2022-10-10</a:t>
             </a:fld>
             <a:endParaRPr lang="ko-KR" altLang="en-US"/>
           </a:p>
@@ -3002,7 +3005,7 @@
           <a:p>
             <a:fld id="{9A87183D-DD90-4DD0-9571-682C12DD2772}" type="datetimeFigureOut">
               <a:rPr lang="ko-KR" altLang="en-US" smtClean="0"/>
-              <a:t>2022-09-24</a:t>
+              <a:t>2022-10-10</a:t>
             </a:fld>
             <a:endParaRPr lang="ko-KR" altLang="en-US"/>
           </a:p>
@@ -3290,7 +3293,7 @@
           <a:p>
             <a:fld id="{9A87183D-DD90-4DD0-9571-682C12DD2772}" type="datetimeFigureOut">
               <a:rPr lang="ko-KR" altLang="en-US" smtClean="0"/>
-              <a:t>2022-09-24</a:t>
+              <a:t>2022-10-10</a:t>
             </a:fld>
             <a:endParaRPr lang="ko-KR" altLang="en-US"/>
           </a:p>
@@ -3531,7 +3534,7 @@
           <a:p>
             <a:fld id="{9A87183D-DD90-4DD0-9571-682C12DD2772}" type="datetimeFigureOut">
               <a:rPr lang="ko-KR" altLang="en-US" smtClean="0"/>
-              <a:t>2022-09-24</a:t>
+              <a:t>2022-10-10</a:t>
             </a:fld>
             <a:endParaRPr lang="ko-KR" altLang="en-US"/>
           </a:p>
@@ -4038,10 +4041,10 @@
       </p:grpSpPr>
       <p:sp>
         <p:nvSpPr>
-          <p:cNvPr id="4" name="타원 3">
-            <a:extLst>
-              <a:ext uri="{FF2B5EF4-FFF2-40B4-BE49-F238E27FC236}">
-                <a16:creationId xmlns:a16="http://schemas.microsoft.com/office/drawing/2014/main" id="{6BEC0AAC-FE02-DF27-3A44-CD87A258999E}"/>
+          <p:cNvPr id="3" name="자유형: 도형 2">
+            <a:extLst>
+              <a:ext uri="{FF2B5EF4-FFF2-40B4-BE49-F238E27FC236}">
+                <a16:creationId xmlns:a16="http://schemas.microsoft.com/office/drawing/2014/main" id="{D7BEE3F0-B4DD-5654-3E15-D7C68DCB4F79}"/>
               </a:ext>
             </a:extLst>
           </p:cNvPr>
@@ -4049,13 +4052,92 @@
           <p:nvPr/>
         </p:nvSpPr>
         <p:spPr>
-          <a:xfrm>
-            <a:off x="4749679" y="2738865"/>
-            <a:ext cx="1716126" cy="1716126"/>
-          </a:xfrm>
-          <a:prstGeom prst="ellipse">
+          <a:xfrm flipV="1">
+            <a:off x="0" y="5524500"/>
+            <a:ext cx="4311941" cy="1294528"/>
+          </a:xfrm>
+          <a:custGeom>
             <a:avLst/>
-          </a:prstGeom>
+            <a:gdLst>
+              <a:gd name="connsiteX0" fmla="*/ 0 w 4311941"/>
+              <a:gd name="connsiteY0" fmla="*/ 1283516 h 1327406"/>
+              <a:gd name="connsiteX1" fmla="*/ 1996580 w 4311941"/>
+              <a:gd name="connsiteY1" fmla="*/ 1266738 h 1327406"/>
+              <a:gd name="connsiteX2" fmla="*/ 3028426 w 4311941"/>
+              <a:gd name="connsiteY2" fmla="*/ 696286 h 1327406"/>
+              <a:gd name="connsiteX3" fmla="*/ 4009938 w 4311941"/>
+              <a:gd name="connsiteY3" fmla="*/ 352338 h 1327406"/>
+              <a:gd name="connsiteX4" fmla="*/ 4311941 w 4311941"/>
+              <a:gd name="connsiteY4" fmla="*/ 0 h 1327406"/>
+              <a:gd name="connsiteX0" fmla="*/ 0 w 4311941"/>
+              <a:gd name="connsiteY0" fmla="*/ 1283516 h 1314688"/>
+              <a:gd name="connsiteX1" fmla="*/ 1996580 w 4311941"/>
+              <a:gd name="connsiteY1" fmla="*/ 1266738 h 1314688"/>
+              <a:gd name="connsiteX2" fmla="*/ 3028426 w 4311941"/>
+              <a:gd name="connsiteY2" fmla="*/ 696286 h 1314688"/>
+              <a:gd name="connsiteX3" fmla="*/ 4009938 w 4311941"/>
+              <a:gd name="connsiteY3" fmla="*/ 352338 h 1314688"/>
+              <a:gd name="connsiteX4" fmla="*/ 4311941 w 4311941"/>
+              <a:gd name="connsiteY4" fmla="*/ 0 h 1314688"/>
+              <a:gd name="connsiteX0" fmla="*/ 0 w 4311941"/>
+              <a:gd name="connsiteY0" fmla="*/ 1283516 h 1294528"/>
+              <a:gd name="connsiteX1" fmla="*/ 1996580 w 4311941"/>
+              <a:gd name="connsiteY1" fmla="*/ 1233182 h 1294528"/>
+              <a:gd name="connsiteX2" fmla="*/ 3028426 w 4311941"/>
+              <a:gd name="connsiteY2" fmla="*/ 696286 h 1294528"/>
+              <a:gd name="connsiteX3" fmla="*/ 4009938 w 4311941"/>
+              <a:gd name="connsiteY3" fmla="*/ 352338 h 1294528"/>
+              <a:gd name="connsiteX4" fmla="*/ 4311941 w 4311941"/>
+              <a:gd name="connsiteY4" fmla="*/ 0 h 1294528"/>
+            </a:gdLst>
+            <a:ahLst/>
+            <a:cxnLst>
+              <a:cxn ang="0">
+                <a:pos x="connsiteX0" y="connsiteY0"/>
+              </a:cxn>
+              <a:cxn ang="0">
+                <a:pos x="connsiteX1" y="connsiteY1"/>
+              </a:cxn>
+              <a:cxn ang="0">
+                <a:pos x="connsiteX2" y="connsiteY2"/>
+              </a:cxn>
+              <a:cxn ang="0">
+                <a:pos x="connsiteX3" y="connsiteY3"/>
+              </a:cxn>
+              <a:cxn ang="0">
+                <a:pos x="connsiteX4" y="connsiteY4"/>
+              </a:cxn>
+            </a:cxnLst>
+            <a:rect l="l" t="t" r="r" b="b"/>
+            <a:pathLst>
+              <a:path w="4311941" h="1294528">
+                <a:moveTo>
+                  <a:pt x="0" y="1283516"/>
+                </a:moveTo>
+                <a:cubicBezTo>
+                  <a:pt x="729143" y="1282118"/>
+                  <a:pt x="1491842" y="1331054"/>
+                  <a:pt x="1996580" y="1233182"/>
+                </a:cubicBezTo>
+                <a:cubicBezTo>
+                  <a:pt x="2501318" y="1135310"/>
+                  <a:pt x="2692866" y="843093"/>
+                  <a:pt x="3028426" y="696286"/>
+                </a:cubicBezTo>
+                <a:cubicBezTo>
+                  <a:pt x="3363986" y="549479"/>
+                  <a:pt x="3796019" y="468386"/>
+                  <a:pt x="4009938" y="352338"/>
+                </a:cubicBezTo>
+                <a:cubicBezTo>
+                  <a:pt x="4223857" y="236290"/>
+                  <a:pt x="4263005" y="57325"/>
+                  <a:pt x="4311941" y="0"/>
+                </a:cubicBezTo>
+              </a:path>
+            </a:pathLst>
+          </a:custGeom>
+          <a:noFill/>
         </p:spPr>
         <p:style>
           <a:lnRef idx="2">
@@ -4084,10 +4166,10 @@
       </p:sp>
       <p:sp>
         <p:nvSpPr>
-          <p:cNvPr id="6" name="타원 5">
-            <a:extLst>
-              <a:ext uri="{FF2B5EF4-FFF2-40B4-BE49-F238E27FC236}">
-                <a16:creationId xmlns:a16="http://schemas.microsoft.com/office/drawing/2014/main" id="{F3166636-5269-EF3C-0EE9-F6D39995609A}"/>
+          <p:cNvPr id="5" name="자유형: 도형 4">
+            <a:extLst>
+              <a:ext uri="{FF2B5EF4-FFF2-40B4-BE49-F238E27FC236}">
+                <a16:creationId xmlns:a16="http://schemas.microsoft.com/office/drawing/2014/main" id="{A24E09F5-C8BD-501D-37A9-39114F526031}"/>
               </a:ext>
             </a:extLst>
           </p:cNvPr>
@@ -4096,12 +4178,171 @@
         </p:nvSpPr>
         <p:spPr>
           <a:xfrm>
-            <a:off x="5399727" y="3394331"/>
-            <a:ext cx="416030" cy="416030"/>
-          </a:xfrm>
-          <a:prstGeom prst="ellipse">
+            <a:off x="0" y="-104775"/>
+            <a:ext cx="4457700" cy="1655847"/>
+          </a:xfrm>
+          <a:custGeom>
+            <a:avLst/>
+            <a:gdLst>
+              <a:gd name="connsiteX0" fmla="*/ 0 w 4311941"/>
+              <a:gd name="connsiteY0" fmla="*/ 1283516 h 1327406"/>
+              <a:gd name="connsiteX1" fmla="*/ 1996580 w 4311941"/>
+              <a:gd name="connsiteY1" fmla="*/ 1266738 h 1327406"/>
+              <a:gd name="connsiteX2" fmla="*/ 3028426 w 4311941"/>
+              <a:gd name="connsiteY2" fmla="*/ 696286 h 1327406"/>
+              <a:gd name="connsiteX3" fmla="*/ 4009938 w 4311941"/>
+              <a:gd name="connsiteY3" fmla="*/ 352338 h 1327406"/>
+              <a:gd name="connsiteX4" fmla="*/ 4311941 w 4311941"/>
+              <a:gd name="connsiteY4" fmla="*/ 0 h 1327406"/>
+              <a:gd name="connsiteX0" fmla="*/ 0 w 4311941"/>
+              <a:gd name="connsiteY0" fmla="*/ 1283516 h 1314688"/>
+              <a:gd name="connsiteX1" fmla="*/ 1996580 w 4311941"/>
+              <a:gd name="connsiteY1" fmla="*/ 1266738 h 1314688"/>
+              <a:gd name="connsiteX2" fmla="*/ 3028426 w 4311941"/>
+              <a:gd name="connsiteY2" fmla="*/ 696286 h 1314688"/>
+              <a:gd name="connsiteX3" fmla="*/ 4009938 w 4311941"/>
+              <a:gd name="connsiteY3" fmla="*/ 352338 h 1314688"/>
+              <a:gd name="connsiteX4" fmla="*/ 4311941 w 4311941"/>
+              <a:gd name="connsiteY4" fmla="*/ 0 h 1314688"/>
+              <a:gd name="connsiteX0" fmla="*/ 0 w 4311941"/>
+              <a:gd name="connsiteY0" fmla="*/ 1283516 h 1294528"/>
+              <a:gd name="connsiteX1" fmla="*/ 1996580 w 4311941"/>
+              <a:gd name="connsiteY1" fmla="*/ 1233182 h 1294528"/>
+              <a:gd name="connsiteX2" fmla="*/ 3028426 w 4311941"/>
+              <a:gd name="connsiteY2" fmla="*/ 696286 h 1294528"/>
+              <a:gd name="connsiteX3" fmla="*/ 4009938 w 4311941"/>
+              <a:gd name="connsiteY3" fmla="*/ 352338 h 1294528"/>
+              <a:gd name="connsiteX4" fmla="*/ 4311941 w 4311941"/>
+              <a:gd name="connsiteY4" fmla="*/ 0 h 1294528"/>
+            </a:gdLst>
+            <a:ahLst/>
+            <a:cxnLst>
+              <a:cxn ang="0">
+                <a:pos x="connsiteX0" y="connsiteY0"/>
+              </a:cxn>
+              <a:cxn ang="0">
+                <a:pos x="connsiteX1" y="connsiteY1"/>
+              </a:cxn>
+              <a:cxn ang="0">
+                <a:pos x="connsiteX2" y="connsiteY2"/>
+              </a:cxn>
+              <a:cxn ang="0">
+                <a:pos x="connsiteX3" y="connsiteY3"/>
+              </a:cxn>
+              <a:cxn ang="0">
+                <a:pos x="connsiteX4" y="connsiteY4"/>
+              </a:cxn>
+            </a:cxnLst>
+            <a:rect l="l" t="t" r="r" b="b"/>
+            <a:pathLst>
+              <a:path w="4311941" h="1294528">
+                <a:moveTo>
+                  <a:pt x="0" y="1283516"/>
+                </a:moveTo>
+                <a:cubicBezTo>
+                  <a:pt x="729143" y="1282118"/>
+                  <a:pt x="1491842" y="1331054"/>
+                  <a:pt x="1996580" y="1233182"/>
+                </a:cubicBezTo>
+                <a:cubicBezTo>
+                  <a:pt x="2501318" y="1135310"/>
+                  <a:pt x="2692866" y="843093"/>
+                  <a:pt x="3028426" y="696286"/>
+                </a:cubicBezTo>
+                <a:cubicBezTo>
+                  <a:pt x="3363986" y="549479"/>
+                  <a:pt x="3796019" y="468386"/>
+                  <a:pt x="4009938" y="352338"/>
+                </a:cubicBezTo>
+                <a:cubicBezTo>
+                  <a:pt x="4223857" y="236290"/>
+                  <a:pt x="4263005" y="57325"/>
+                  <a:pt x="4311941" y="0"/>
+                </a:cubicBezTo>
+              </a:path>
+            </a:pathLst>
+          </a:custGeom>
+          <a:ln/>
+        </p:spPr>
+        <p:style>
+          <a:lnRef idx="1">
+            <a:schemeClr val="dk1"/>
+          </a:lnRef>
+          <a:fillRef idx="0">
+            <a:schemeClr val="dk1"/>
+          </a:fillRef>
+          <a:effectRef idx="0">
+            <a:schemeClr val="dk1"/>
+          </a:effectRef>
+          <a:fontRef idx="minor">
+            <a:schemeClr val="tx1"/>
+          </a:fontRef>
+        </p:style>
+        <p:txBody>
+          <a:bodyPr rtlCol="0" anchor="ctr"/>
+          <a:lstStyle/>
+          <a:p>
+            <a:pPr algn="ctr"/>
+            <a:endParaRPr lang="ko-KR" altLang="en-US"/>
+          </a:p>
+        </p:txBody>
+      </p:sp>
+    </p:spTree>
+    <p:extLst>
+      <p:ext uri="{BB962C8B-B14F-4D97-AF65-F5344CB8AC3E}">
+        <p14:creationId xmlns:p14="http://schemas.microsoft.com/office/powerpoint/2010/main" val="3132788510"/>
+      </p:ext>
+    </p:extLst>
+  </p:cSld>
+  <p:clrMapOvr>
+    <a:masterClrMapping/>
+  </p:clrMapOvr>
+</p:sld>
+</file>
+
+<file path=ppt/slides/slide11.xml><?xml version="1.0" encoding="utf-8"?>
+<p:sld xmlns:a="http://schemas.openxmlformats.org/drawingml/2006/main" xmlns:r="http://schemas.openxmlformats.org/officeDocument/2006/relationships" xmlns:p="http://schemas.openxmlformats.org/presentationml/2006/main">
+  <p:cSld>
+    <p:spTree>
+      <p:nvGrpSpPr>
+        <p:cNvPr id="1" name=""/>
+        <p:cNvGrpSpPr/>
+        <p:nvPr/>
+      </p:nvGrpSpPr>
+      <p:grpSpPr>
+        <a:xfrm>
+          <a:off x="0" y="0"/>
+          <a:ext cx="0" cy="0"/>
+          <a:chOff x="0" y="0"/>
+          <a:chExt cx="0" cy="0"/>
+        </a:xfrm>
+      </p:grpSpPr>
+      <p:sp>
+        <p:nvSpPr>
+          <p:cNvPr id="13" name="직사각형 12">
+            <a:extLst>
+              <a:ext uri="{FF2B5EF4-FFF2-40B4-BE49-F238E27FC236}">
+                <a16:creationId xmlns:a16="http://schemas.microsoft.com/office/drawing/2014/main" id="{CBE2EBA4-B7A7-CE94-6364-F07290FD5DB6}"/>
+              </a:ext>
+            </a:extLst>
+          </p:cNvPr>
+          <p:cNvSpPr/>
+          <p:nvPr/>
+        </p:nvSpPr>
+        <p:spPr>
+          <a:xfrm>
+            <a:off x="0" y="0"/>
+            <a:ext cx="12192000" cy="559837"/>
+          </a:xfrm>
+          <a:prstGeom prst="rect">
             <a:avLst/>
           </a:prstGeom>
+          <a:solidFill>
+            <a:schemeClr val="bg2"/>
+          </a:solidFill>
+          <a:ln>
+            <a:noFill/>
+          </a:ln>
         </p:spPr>
         <p:style>
           <a:lnRef idx="2">
@@ -4128,6 +4369,1050 @@
           </a:p>
         </p:txBody>
       </p:sp>
+      <p:sp>
+        <p:nvSpPr>
+          <p:cNvPr id="4" name="직사각형 3">
+            <a:extLst>
+              <a:ext uri="{FF2B5EF4-FFF2-40B4-BE49-F238E27FC236}">
+                <a16:creationId xmlns:a16="http://schemas.microsoft.com/office/drawing/2014/main" id="{F55349CF-3223-CC91-09D1-C84B3F1651FA}"/>
+              </a:ext>
+            </a:extLst>
+          </p:cNvPr>
+          <p:cNvSpPr/>
+          <p:nvPr/>
+        </p:nvSpPr>
+        <p:spPr>
+          <a:xfrm>
+            <a:off x="0" y="6298163"/>
+            <a:ext cx="12192000" cy="559837"/>
+          </a:xfrm>
+          <a:prstGeom prst="rect">
+            <a:avLst/>
+          </a:prstGeom>
+          <a:solidFill>
+            <a:schemeClr val="bg2"/>
+          </a:solidFill>
+          <a:ln>
+            <a:noFill/>
+          </a:ln>
+        </p:spPr>
+        <p:style>
+          <a:lnRef idx="2">
+            <a:schemeClr val="accent1">
+              <a:shade val="50000"/>
+            </a:schemeClr>
+          </a:lnRef>
+          <a:fillRef idx="1">
+            <a:schemeClr val="accent1"/>
+          </a:fillRef>
+          <a:effectRef idx="0">
+            <a:schemeClr val="accent1"/>
+          </a:effectRef>
+          <a:fontRef idx="minor">
+            <a:schemeClr val="lt1"/>
+          </a:fontRef>
+        </p:style>
+        <p:txBody>
+          <a:bodyPr rtlCol="0" anchor="ctr"/>
+          <a:lstStyle/>
+          <a:p>
+            <a:pPr algn="ctr"/>
+            <a:endParaRPr lang="ko-KR" altLang="en-US"/>
+          </a:p>
+        </p:txBody>
+      </p:sp>
+      <p:sp>
+        <p:nvSpPr>
+          <p:cNvPr id="5" name="직사각형 4">
+            <a:extLst>
+              <a:ext uri="{FF2B5EF4-FFF2-40B4-BE49-F238E27FC236}">
+                <a16:creationId xmlns:a16="http://schemas.microsoft.com/office/drawing/2014/main" id="{802DB6B5-FAA6-79F1-98D9-6F23BE1E3C85}"/>
+              </a:ext>
+            </a:extLst>
+          </p:cNvPr>
+          <p:cNvSpPr/>
+          <p:nvPr/>
+        </p:nvSpPr>
+        <p:spPr>
+          <a:xfrm>
+            <a:off x="5350635" y="-9501"/>
+            <a:ext cx="1029020" cy="559837"/>
+          </a:xfrm>
+          <a:prstGeom prst="rect">
+            <a:avLst/>
+          </a:prstGeom>
+          <a:solidFill>
+            <a:schemeClr val="accent3"/>
+          </a:solidFill>
+          <a:ln>
+            <a:solidFill>
+              <a:schemeClr val="tx1"/>
+            </a:solidFill>
+          </a:ln>
+        </p:spPr>
+        <p:style>
+          <a:lnRef idx="2">
+            <a:schemeClr val="accent1">
+              <a:shade val="50000"/>
+            </a:schemeClr>
+          </a:lnRef>
+          <a:fillRef idx="1">
+            <a:schemeClr val="accent1"/>
+          </a:fillRef>
+          <a:effectRef idx="0">
+            <a:schemeClr val="accent1"/>
+          </a:effectRef>
+          <a:fontRef idx="minor">
+            <a:schemeClr val="lt1"/>
+          </a:fontRef>
+        </p:style>
+        <p:txBody>
+          <a:bodyPr rtlCol="0" anchor="ctr"/>
+          <a:lstStyle/>
+          <a:p>
+            <a:pPr algn="ctr"/>
+            <a:r>
+              <a:rPr lang="en-US" altLang="ko-KR"/>
+              <a:t>Mods</a:t>
+            </a:r>
+            <a:endParaRPr lang="ko-KR" altLang="en-US"/>
+          </a:p>
+        </p:txBody>
+      </p:sp>
+      <p:sp>
+        <p:nvSpPr>
+          <p:cNvPr id="7" name="직사각형 6">
+            <a:extLst>
+              <a:ext uri="{FF2B5EF4-FFF2-40B4-BE49-F238E27FC236}">
+                <a16:creationId xmlns:a16="http://schemas.microsoft.com/office/drawing/2014/main" id="{CA9BFD7C-DFD4-5312-0BE0-8928C36C4AEF}"/>
+              </a:ext>
+            </a:extLst>
+          </p:cNvPr>
+          <p:cNvSpPr/>
+          <p:nvPr/>
+        </p:nvSpPr>
+        <p:spPr>
+          <a:xfrm>
+            <a:off x="-8389" y="6298163"/>
+            <a:ext cx="1029020" cy="559837"/>
+          </a:xfrm>
+          <a:prstGeom prst="rect">
+            <a:avLst/>
+          </a:prstGeom>
+          <a:solidFill>
+            <a:schemeClr val="accent3"/>
+          </a:solidFill>
+          <a:ln>
+            <a:solidFill>
+              <a:schemeClr val="tx1"/>
+            </a:solidFill>
+          </a:ln>
+        </p:spPr>
+        <p:style>
+          <a:lnRef idx="2">
+            <a:schemeClr val="accent1">
+              <a:shade val="50000"/>
+            </a:schemeClr>
+          </a:lnRef>
+          <a:fillRef idx="1">
+            <a:schemeClr val="accent1"/>
+          </a:fillRef>
+          <a:effectRef idx="0">
+            <a:schemeClr val="accent1"/>
+          </a:effectRef>
+          <a:fontRef idx="minor">
+            <a:schemeClr val="lt1"/>
+          </a:fontRef>
+        </p:style>
+        <p:txBody>
+          <a:bodyPr rtlCol="0" anchor="ctr"/>
+          <a:lstStyle/>
+          <a:p>
+            <a:pPr algn="ctr"/>
+            <a:r>
+              <a:rPr lang="en-US" altLang="ko-KR"/>
+              <a:t>Back</a:t>
+            </a:r>
+            <a:endParaRPr lang="ko-KR" altLang="en-US"/>
+          </a:p>
+        </p:txBody>
+      </p:sp>
+      <p:sp>
+        <p:nvSpPr>
+          <p:cNvPr id="9" name="직사각형 8">
+            <a:extLst>
+              <a:ext uri="{FF2B5EF4-FFF2-40B4-BE49-F238E27FC236}">
+                <a16:creationId xmlns:a16="http://schemas.microsoft.com/office/drawing/2014/main" id="{9A572247-B942-D5F1-81FB-4EDFED2EC5AB}"/>
+              </a:ext>
+            </a:extLst>
+          </p:cNvPr>
+          <p:cNvSpPr/>
+          <p:nvPr/>
+        </p:nvSpPr>
+        <p:spPr>
+          <a:xfrm>
+            <a:off x="10276514" y="5771627"/>
+            <a:ext cx="1915486" cy="1095874"/>
+          </a:xfrm>
+          <a:prstGeom prst="rect">
+            <a:avLst/>
+          </a:prstGeom>
+          <a:solidFill>
+            <a:schemeClr val="accent3"/>
+          </a:solidFill>
+          <a:ln>
+            <a:solidFill>
+              <a:schemeClr val="tx1"/>
+            </a:solidFill>
+          </a:ln>
+        </p:spPr>
+        <p:style>
+          <a:lnRef idx="2">
+            <a:schemeClr val="accent1">
+              <a:shade val="50000"/>
+            </a:schemeClr>
+          </a:lnRef>
+          <a:fillRef idx="1">
+            <a:schemeClr val="accent1"/>
+          </a:fillRef>
+          <a:effectRef idx="0">
+            <a:schemeClr val="accent1"/>
+          </a:effectRef>
+          <a:fontRef idx="minor">
+            <a:schemeClr val="lt1"/>
+          </a:fontRef>
+        </p:style>
+        <p:txBody>
+          <a:bodyPr rtlCol="0" anchor="ctr"/>
+          <a:lstStyle/>
+          <a:p>
+            <a:pPr algn="ctr"/>
+            <a:r>
+              <a:rPr lang="en-US" altLang="ko-KR" sz="2400"/>
+              <a:t>Play</a:t>
+            </a:r>
+            <a:endParaRPr lang="ko-KR" altLang="en-US" sz="2400"/>
+          </a:p>
+        </p:txBody>
+      </p:sp>
+      <p:sp>
+        <p:nvSpPr>
+          <p:cNvPr id="11" name="직사각형 10">
+            <a:extLst>
+              <a:ext uri="{FF2B5EF4-FFF2-40B4-BE49-F238E27FC236}">
+                <a16:creationId xmlns:a16="http://schemas.microsoft.com/office/drawing/2014/main" id="{3AA847A8-0A67-2861-A011-7249D32DB7E4}"/>
+              </a:ext>
+            </a:extLst>
+          </p:cNvPr>
+          <p:cNvSpPr/>
+          <p:nvPr/>
+        </p:nvSpPr>
+        <p:spPr>
+          <a:xfrm>
+            <a:off x="2779922" y="6297050"/>
+            <a:ext cx="1029020" cy="559837"/>
+          </a:xfrm>
+          <a:prstGeom prst="rect">
+            <a:avLst/>
+          </a:prstGeom>
+          <a:solidFill>
+            <a:schemeClr val="accent3"/>
+          </a:solidFill>
+          <a:ln>
+            <a:solidFill>
+              <a:schemeClr val="tx1"/>
+            </a:solidFill>
+          </a:ln>
+        </p:spPr>
+        <p:style>
+          <a:lnRef idx="2">
+            <a:schemeClr val="accent1">
+              <a:shade val="50000"/>
+            </a:schemeClr>
+          </a:lnRef>
+          <a:fillRef idx="1">
+            <a:schemeClr val="accent1"/>
+          </a:fillRef>
+          <a:effectRef idx="0">
+            <a:schemeClr val="accent1"/>
+          </a:effectRef>
+          <a:fontRef idx="minor">
+            <a:schemeClr val="lt1"/>
+          </a:fontRef>
+        </p:style>
+        <p:txBody>
+          <a:bodyPr rtlCol="0" anchor="ctr"/>
+          <a:lstStyle/>
+          <a:p>
+            <a:pPr algn="ctr"/>
+            <a:r>
+              <a:rPr lang="en-US" altLang="ko-KR"/>
+              <a:t>Tags</a:t>
+            </a:r>
+            <a:br>
+              <a:rPr lang="en-US" altLang="ko-KR"/>
+            </a:br>
+            <a:r>
+              <a:rPr lang="en-US" altLang="ko-KR"/>
+              <a:t>Collect.</a:t>
+            </a:r>
+            <a:endParaRPr lang="ko-KR" altLang="en-US"/>
+          </a:p>
+        </p:txBody>
+      </p:sp>
+      <p:sp>
+        <p:nvSpPr>
+          <p:cNvPr id="15" name="직사각형 14">
+            <a:extLst>
+              <a:ext uri="{FF2B5EF4-FFF2-40B4-BE49-F238E27FC236}">
+                <a16:creationId xmlns:a16="http://schemas.microsoft.com/office/drawing/2014/main" id="{B8E9083D-7CF8-C4BE-9644-9BB7DC2E119B}"/>
+              </a:ext>
+            </a:extLst>
+          </p:cNvPr>
+          <p:cNvSpPr/>
+          <p:nvPr/>
+        </p:nvSpPr>
+        <p:spPr>
+          <a:xfrm>
+            <a:off x="3817331" y="6298163"/>
+            <a:ext cx="1029020" cy="559837"/>
+          </a:xfrm>
+          <a:prstGeom prst="rect">
+            <a:avLst/>
+          </a:prstGeom>
+          <a:solidFill>
+            <a:schemeClr val="accent3"/>
+          </a:solidFill>
+          <a:ln>
+            <a:solidFill>
+              <a:schemeClr val="tx1"/>
+            </a:solidFill>
+          </a:ln>
+        </p:spPr>
+        <p:style>
+          <a:lnRef idx="2">
+            <a:schemeClr val="accent1">
+              <a:shade val="50000"/>
+            </a:schemeClr>
+          </a:lnRef>
+          <a:fillRef idx="1">
+            <a:schemeClr val="accent1"/>
+          </a:fillRef>
+          <a:effectRef idx="0">
+            <a:schemeClr val="accent1"/>
+          </a:effectRef>
+          <a:fontRef idx="minor">
+            <a:schemeClr val="lt1"/>
+          </a:fontRef>
+        </p:style>
+        <p:txBody>
+          <a:bodyPr rtlCol="0" anchor="ctr"/>
+          <a:lstStyle/>
+          <a:p>
+            <a:pPr algn="ctr"/>
+            <a:r>
+              <a:rPr lang="en-US" altLang="ko-KR"/>
+              <a:t>Editor</a:t>
+            </a:r>
+            <a:endParaRPr lang="ko-KR" altLang="en-US"/>
+          </a:p>
+        </p:txBody>
+      </p:sp>
+      <p:sp>
+        <p:nvSpPr>
+          <p:cNvPr id="19" name="직사각형 18">
+            <a:extLst>
+              <a:ext uri="{FF2B5EF4-FFF2-40B4-BE49-F238E27FC236}">
+                <a16:creationId xmlns:a16="http://schemas.microsoft.com/office/drawing/2014/main" id="{36B73C17-F75D-DE64-730C-2FD219EEAB3A}"/>
+              </a:ext>
+            </a:extLst>
+          </p:cNvPr>
+          <p:cNvSpPr/>
+          <p:nvPr/>
+        </p:nvSpPr>
+        <p:spPr>
+          <a:xfrm>
+            <a:off x="7416188" y="0"/>
+            <a:ext cx="712694" cy="560950"/>
+          </a:xfrm>
+          <a:prstGeom prst="rect">
+            <a:avLst/>
+          </a:prstGeom>
+          <a:solidFill>
+            <a:schemeClr val="accent3"/>
+          </a:solidFill>
+          <a:ln>
+            <a:solidFill>
+              <a:schemeClr val="tx1"/>
+            </a:solidFill>
+          </a:ln>
+        </p:spPr>
+        <p:style>
+          <a:lnRef idx="2">
+            <a:schemeClr val="accent1">
+              <a:shade val="50000"/>
+            </a:schemeClr>
+          </a:lnRef>
+          <a:fillRef idx="1">
+            <a:schemeClr val="accent1"/>
+          </a:fillRef>
+          <a:effectRef idx="0">
+            <a:schemeClr val="accent1"/>
+          </a:effectRef>
+          <a:fontRef idx="minor">
+            <a:schemeClr val="lt1"/>
+          </a:fontRef>
+        </p:style>
+        <p:txBody>
+          <a:bodyPr rtlCol="0" anchor="ctr"/>
+          <a:lstStyle/>
+          <a:p>
+            <a:pPr algn="ctr"/>
+            <a:r>
+              <a:rPr lang="en-US" altLang="ko-KR" sz="1600"/>
+              <a:t>Img</a:t>
+            </a:r>
+            <a:endParaRPr lang="ko-KR" altLang="en-US" sz="1600"/>
+          </a:p>
+        </p:txBody>
+      </p:sp>
+      <p:sp>
+        <p:nvSpPr>
+          <p:cNvPr id="21" name="직사각형 20">
+            <a:extLst>
+              <a:ext uri="{FF2B5EF4-FFF2-40B4-BE49-F238E27FC236}">
+                <a16:creationId xmlns:a16="http://schemas.microsoft.com/office/drawing/2014/main" id="{783120F7-80E0-5C78-5FC7-A8E41948E1F6}"/>
+              </a:ext>
+            </a:extLst>
+          </p:cNvPr>
+          <p:cNvSpPr/>
+          <p:nvPr/>
+        </p:nvSpPr>
+        <p:spPr>
+          <a:xfrm>
+            <a:off x="8147370" y="-1113"/>
+            <a:ext cx="2039510" cy="559837"/>
+          </a:xfrm>
+          <a:prstGeom prst="rect">
+            <a:avLst/>
+          </a:prstGeom>
+          <a:solidFill>
+            <a:schemeClr val="accent3"/>
+          </a:solidFill>
+          <a:ln>
+            <a:solidFill>
+              <a:schemeClr val="tx1"/>
+            </a:solidFill>
+          </a:ln>
+        </p:spPr>
+        <p:style>
+          <a:lnRef idx="2">
+            <a:schemeClr val="accent1">
+              <a:shade val="50000"/>
+            </a:schemeClr>
+          </a:lnRef>
+          <a:fillRef idx="1">
+            <a:schemeClr val="accent1"/>
+          </a:fillRef>
+          <a:effectRef idx="0">
+            <a:schemeClr val="accent1"/>
+          </a:effectRef>
+          <a:fontRef idx="minor">
+            <a:schemeClr val="lt1"/>
+          </a:fontRef>
+        </p:style>
+        <p:txBody>
+          <a:bodyPr rtlCol="0" anchor="ctr"/>
+          <a:lstStyle/>
+          <a:p>
+            <a:pPr algn="ctr"/>
+            <a:r>
+              <a:rPr lang="en-US" altLang="ko-KR" dirty="0"/>
+              <a:t>User</a:t>
+            </a:r>
+            <a:endParaRPr lang="ko-KR" altLang="en-US" dirty="0"/>
+          </a:p>
+        </p:txBody>
+      </p:sp>
+      <p:sp>
+        <p:nvSpPr>
+          <p:cNvPr id="22" name="직사각형 21">
+            <a:extLst>
+              <a:ext uri="{FF2B5EF4-FFF2-40B4-BE49-F238E27FC236}">
+                <a16:creationId xmlns:a16="http://schemas.microsoft.com/office/drawing/2014/main" id="{106803AF-5303-1F9A-F988-48832606EC10}"/>
+              </a:ext>
+            </a:extLst>
+          </p:cNvPr>
+          <p:cNvSpPr/>
+          <p:nvPr/>
+        </p:nvSpPr>
+        <p:spPr>
+          <a:xfrm>
+            <a:off x="-8389" y="-9501"/>
+            <a:ext cx="4330005" cy="2621903"/>
+          </a:xfrm>
+          <a:prstGeom prst="rect">
+            <a:avLst/>
+          </a:prstGeom>
+        </p:spPr>
+        <p:style>
+          <a:lnRef idx="2">
+            <a:schemeClr val="accent4">
+              <a:shade val="50000"/>
+            </a:schemeClr>
+          </a:lnRef>
+          <a:fillRef idx="1">
+            <a:schemeClr val="accent4"/>
+          </a:fillRef>
+          <a:effectRef idx="0">
+            <a:schemeClr val="accent4"/>
+          </a:effectRef>
+          <a:fontRef idx="minor">
+            <a:schemeClr val="lt1"/>
+          </a:fontRef>
+        </p:style>
+        <p:txBody>
+          <a:bodyPr rtlCol="0" anchor="ctr"/>
+          <a:lstStyle/>
+          <a:p>
+            <a:pPr algn="ctr"/>
+            <a:r>
+              <a:rPr lang="en-US" altLang="ko-KR"/>
+              <a:t>Chart info</a:t>
+            </a:r>
+            <a:endParaRPr lang="ko-KR" altLang="en-US"/>
+          </a:p>
+        </p:txBody>
+      </p:sp>
+      <p:sp>
+        <p:nvSpPr>
+          <p:cNvPr id="24" name="직사각형 23">
+            <a:extLst>
+              <a:ext uri="{FF2B5EF4-FFF2-40B4-BE49-F238E27FC236}">
+                <a16:creationId xmlns:a16="http://schemas.microsoft.com/office/drawing/2014/main" id="{BE994B68-DC4A-0B08-4216-55DF0BCAD89D}"/>
+              </a:ext>
+            </a:extLst>
+          </p:cNvPr>
+          <p:cNvSpPr/>
+          <p:nvPr/>
+        </p:nvSpPr>
+        <p:spPr>
+          <a:xfrm>
+            <a:off x="-8390" y="2596393"/>
+            <a:ext cx="4330005" cy="3691156"/>
+          </a:xfrm>
+          <a:prstGeom prst="rect">
+            <a:avLst/>
+          </a:prstGeom>
+        </p:spPr>
+        <p:style>
+          <a:lnRef idx="2">
+            <a:schemeClr val="accent6">
+              <a:shade val="50000"/>
+            </a:schemeClr>
+          </a:lnRef>
+          <a:fillRef idx="1">
+            <a:schemeClr val="accent6"/>
+          </a:fillRef>
+          <a:effectRef idx="0">
+            <a:schemeClr val="accent6"/>
+          </a:effectRef>
+          <a:fontRef idx="minor">
+            <a:schemeClr val="lt1"/>
+          </a:fontRef>
+        </p:style>
+        <p:txBody>
+          <a:bodyPr rtlCol="0" anchor="ctr"/>
+          <a:lstStyle/>
+          <a:p>
+            <a:pPr algn="ctr"/>
+            <a:r>
+              <a:rPr lang="en-US" altLang="ko-KR" dirty="0"/>
+              <a:t>Ranking</a:t>
+            </a:r>
+          </a:p>
+          <a:p>
+            <a:pPr algn="ctr"/>
+            <a:r>
+              <a:rPr lang="en-US" altLang="ko-KR" dirty="0"/>
+              <a:t>Player list when at lobby</a:t>
+            </a:r>
+            <a:endParaRPr lang="ko-KR" altLang="en-US" dirty="0"/>
+          </a:p>
+        </p:txBody>
+      </p:sp>
+      <p:sp>
+        <p:nvSpPr>
+          <p:cNvPr id="26" name="직사각형 25">
+            <a:extLst>
+              <a:ext uri="{FF2B5EF4-FFF2-40B4-BE49-F238E27FC236}">
+                <a16:creationId xmlns:a16="http://schemas.microsoft.com/office/drawing/2014/main" id="{90367FBA-6188-A74D-C15D-63715A60AFD5}"/>
+              </a:ext>
+            </a:extLst>
+          </p:cNvPr>
+          <p:cNvSpPr/>
+          <p:nvPr/>
+        </p:nvSpPr>
+        <p:spPr>
+          <a:xfrm>
+            <a:off x="6370390" y="-9501"/>
+            <a:ext cx="1029020" cy="559837"/>
+          </a:xfrm>
+          <a:prstGeom prst="rect">
+            <a:avLst/>
+          </a:prstGeom>
+          <a:solidFill>
+            <a:schemeClr val="accent3"/>
+          </a:solidFill>
+          <a:ln>
+            <a:solidFill>
+              <a:schemeClr val="tx1"/>
+            </a:solidFill>
+          </a:ln>
+        </p:spPr>
+        <p:style>
+          <a:lnRef idx="2">
+            <a:schemeClr val="accent1">
+              <a:shade val="50000"/>
+            </a:schemeClr>
+          </a:lnRef>
+          <a:fillRef idx="1">
+            <a:schemeClr val="accent1"/>
+          </a:fillRef>
+          <a:effectRef idx="0">
+            <a:schemeClr val="accent1"/>
+          </a:effectRef>
+          <a:fontRef idx="minor">
+            <a:schemeClr val="lt1"/>
+          </a:fontRef>
+        </p:style>
+        <p:txBody>
+          <a:bodyPr rtlCol="0" anchor="ctr"/>
+          <a:lstStyle/>
+          <a:p>
+            <a:pPr algn="ctr"/>
+            <a:r>
+              <a:rPr lang="en-US" altLang="ko-KR"/>
+              <a:t>Sort</a:t>
+            </a:r>
+            <a:endParaRPr lang="ko-KR" altLang="en-US"/>
+          </a:p>
+        </p:txBody>
+      </p:sp>
+      <p:sp>
+        <p:nvSpPr>
+          <p:cNvPr id="28" name="직사각형 27">
+            <a:extLst>
+              <a:ext uri="{FF2B5EF4-FFF2-40B4-BE49-F238E27FC236}">
+                <a16:creationId xmlns:a16="http://schemas.microsoft.com/office/drawing/2014/main" id="{B00EE38B-799F-650C-81FD-141EA904738F}"/>
+              </a:ext>
+            </a:extLst>
+          </p:cNvPr>
+          <p:cNvSpPr/>
+          <p:nvPr/>
+        </p:nvSpPr>
+        <p:spPr>
+          <a:xfrm>
+            <a:off x="4321615" y="-19001"/>
+            <a:ext cx="1029020" cy="559837"/>
+          </a:xfrm>
+          <a:prstGeom prst="rect">
+            <a:avLst/>
+          </a:prstGeom>
+          <a:solidFill>
+            <a:schemeClr val="accent3"/>
+          </a:solidFill>
+          <a:ln>
+            <a:solidFill>
+              <a:schemeClr val="tx1"/>
+            </a:solidFill>
+          </a:ln>
+        </p:spPr>
+        <p:style>
+          <a:lnRef idx="2">
+            <a:schemeClr val="accent1">
+              <a:shade val="50000"/>
+            </a:schemeClr>
+          </a:lnRef>
+          <a:fillRef idx="1">
+            <a:schemeClr val="accent1"/>
+          </a:fillRef>
+          <a:effectRef idx="0">
+            <a:schemeClr val="accent1"/>
+          </a:effectRef>
+          <a:fontRef idx="minor">
+            <a:schemeClr val="lt1"/>
+          </a:fontRef>
+        </p:style>
+        <p:txBody>
+          <a:bodyPr rtlCol="0" anchor="ctr"/>
+          <a:lstStyle/>
+          <a:p>
+            <a:pPr algn="ctr"/>
+            <a:r>
+              <a:rPr lang="en-US" altLang="ko-KR"/>
+              <a:t>Mode</a:t>
+            </a:r>
+            <a:endParaRPr lang="ko-KR" altLang="en-US"/>
+          </a:p>
+        </p:txBody>
+      </p:sp>
+      <p:sp>
+        <p:nvSpPr>
+          <p:cNvPr id="32" name="직사각형 31">
+            <a:extLst>
+              <a:ext uri="{FF2B5EF4-FFF2-40B4-BE49-F238E27FC236}">
+                <a16:creationId xmlns:a16="http://schemas.microsoft.com/office/drawing/2014/main" id="{0D283D03-E6F9-FDC9-157B-7BB76EFFD791}"/>
+              </a:ext>
+            </a:extLst>
+          </p:cNvPr>
+          <p:cNvSpPr/>
+          <p:nvPr/>
+        </p:nvSpPr>
+        <p:spPr>
+          <a:xfrm>
+            <a:off x="7416188" y="578837"/>
+            <a:ext cx="4784201" cy="279919"/>
+          </a:xfrm>
+          <a:prstGeom prst="rect">
+            <a:avLst/>
+          </a:prstGeom>
+          <a:ln/>
+        </p:spPr>
+        <p:style>
+          <a:lnRef idx="3">
+            <a:schemeClr val="lt1"/>
+          </a:lnRef>
+          <a:fillRef idx="1">
+            <a:schemeClr val="accent1"/>
+          </a:fillRef>
+          <a:effectRef idx="1">
+            <a:schemeClr val="accent1"/>
+          </a:effectRef>
+          <a:fontRef idx="minor">
+            <a:schemeClr val="lt1"/>
+          </a:fontRef>
+        </p:style>
+        <p:txBody>
+          <a:bodyPr rtlCol="0" anchor="ctr"/>
+          <a:lstStyle/>
+          <a:p>
+            <a:pPr algn="ctr"/>
+            <a:r>
+              <a:rPr lang="en-US" altLang="ko-KR"/>
+              <a:t>Search</a:t>
+            </a:r>
+            <a:endParaRPr lang="ko-KR" altLang="en-US"/>
+          </a:p>
+        </p:txBody>
+      </p:sp>
+      <p:sp>
+        <p:nvSpPr>
+          <p:cNvPr id="34" name="직사각형 33">
+            <a:extLst>
+              <a:ext uri="{FF2B5EF4-FFF2-40B4-BE49-F238E27FC236}">
+                <a16:creationId xmlns:a16="http://schemas.microsoft.com/office/drawing/2014/main" id="{588E1E37-2295-3D1E-EFFA-F3242066BF1F}"/>
+              </a:ext>
+            </a:extLst>
+          </p:cNvPr>
+          <p:cNvSpPr/>
+          <p:nvPr/>
+        </p:nvSpPr>
+        <p:spPr>
+          <a:xfrm>
+            <a:off x="4836125" y="6298163"/>
+            <a:ext cx="1029020" cy="559837"/>
+          </a:xfrm>
+          <a:prstGeom prst="rect">
+            <a:avLst/>
+          </a:prstGeom>
+          <a:solidFill>
+            <a:schemeClr val="accent3"/>
+          </a:solidFill>
+          <a:ln>
+            <a:solidFill>
+              <a:schemeClr val="tx1"/>
+            </a:solidFill>
+          </a:ln>
+        </p:spPr>
+        <p:style>
+          <a:lnRef idx="2">
+            <a:schemeClr val="accent1">
+              <a:shade val="50000"/>
+            </a:schemeClr>
+          </a:lnRef>
+          <a:fillRef idx="1">
+            <a:schemeClr val="accent1"/>
+          </a:fillRef>
+          <a:effectRef idx="0">
+            <a:schemeClr val="accent1"/>
+          </a:effectRef>
+          <a:fontRef idx="minor">
+            <a:schemeClr val="lt1"/>
+          </a:fontRef>
+        </p:style>
+        <p:txBody>
+          <a:bodyPr rtlCol="0" anchor="ctr"/>
+          <a:lstStyle/>
+          <a:p>
+            <a:pPr algn="ctr"/>
+            <a:r>
+              <a:rPr lang="en-US" altLang="ko-KR"/>
+              <a:t>Options</a:t>
+            </a:r>
+            <a:endParaRPr lang="ko-KR" altLang="en-US"/>
+          </a:p>
+        </p:txBody>
+      </p:sp>
+      <p:sp>
+        <p:nvSpPr>
+          <p:cNvPr id="3" name="직사각형 2">
+            <a:extLst>
+              <a:ext uri="{FF2B5EF4-FFF2-40B4-BE49-F238E27FC236}">
+                <a16:creationId xmlns:a16="http://schemas.microsoft.com/office/drawing/2014/main" id="{DCB1CA92-C1A3-3222-BF0B-A42BAD23AF3F}"/>
+              </a:ext>
+            </a:extLst>
+          </p:cNvPr>
+          <p:cNvSpPr/>
+          <p:nvPr/>
+        </p:nvSpPr>
+        <p:spPr>
+          <a:xfrm>
+            <a:off x="10186880" y="-9501"/>
+            <a:ext cx="2039510" cy="559837"/>
+          </a:xfrm>
+          <a:prstGeom prst="rect">
+            <a:avLst/>
+          </a:prstGeom>
+          <a:solidFill>
+            <a:schemeClr val="accent3"/>
+          </a:solidFill>
+          <a:ln>
+            <a:solidFill>
+              <a:schemeClr val="tx1"/>
+            </a:solidFill>
+          </a:ln>
+        </p:spPr>
+        <p:style>
+          <a:lnRef idx="2">
+            <a:schemeClr val="accent1">
+              <a:shade val="50000"/>
+            </a:schemeClr>
+          </a:lnRef>
+          <a:fillRef idx="1">
+            <a:schemeClr val="accent1"/>
+          </a:fillRef>
+          <a:effectRef idx="0">
+            <a:schemeClr val="accent1"/>
+          </a:effectRef>
+          <a:fontRef idx="minor">
+            <a:schemeClr val="lt1"/>
+          </a:fontRef>
+        </p:style>
+        <p:txBody>
+          <a:bodyPr rtlCol="0" anchor="ctr"/>
+          <a:lstStyle/>
+          <a:p>
+            <a:pPr algn="ctr"/>
+            <a:r>
+              <a:rPr lang="en-US" altLang="ko-KR"/>
+              <a:t>Statistics</a:t>
+            </a:r>
+            <a:endParaRPr lang="ko-KR" altLang="en-US" dirty="0"/>
+          </a:p>
+        </p:txBody>
+      </p:sp>
+    </p:spTree>
+    <p:extLst>
+      <p:ext uri="{BB962C8B-B14F-4D97-AF65-F5344CB8AC3E}">
+        <p14:creationId xmlns:p14="http://schemas.microsoft.com/office/powerpoint/2010/main" val="3371721876"/>
+      </p:ext>
+    </p:extLst>
+  </p:cSld>
+  <p:clrMapOvr>
+    <a:masterClrMapping/>
+  </p:clrMapOvr>
+</p:sld>
+</file>
+
+<file path=ppt/slides/slide12.xml><?xml version="1.0" encoding="utf-8"?>
+<p:sld xmlns:a="http://schemas.openxmlformats.org/drawingml/2006/main" xmlns:r="http://schemas.openxmlformats.org/officeDocument/2006/relationships" xmlns:p="http://schemas.openxmlformats.org/presentationml/2006/main">
+  <p:cSld>
+    <p:spTree>
+      <p:nvGrpSpPr>
+        <p:cNvPr id="1" name=""/>
+        <p:cNvGrpSpPr/>
+        <p:nvPr/>
+      </p:nvGrpSpPr>
+      <p:grpSpPr>
+        <a:xfrm>
+          <a:off x="0" y="0"/>
+          <a:ext cx="0" cy="0"/>
+          <a:chOff x="0" y="0"/>
+          <a:chExt cx="0" cy="0"/>
+        </a:xfrm>
+      </p:grpSpPr>
+      <p:pic>
+        <p:nvPicPr>
+          <p:cNvPr id="3" name="그래픽 2">
+            <a:extLst>
+              <a:ext uri="{FF2B5EF4-FFF2-40B4-BE49-F238E27FC236}">
+                <a16:creationId xmlns:a16="http://schemas.microsoft.com/office/drawing/2014/main" id="{6EF15F76-81F4-63B1-B380-56118D68C9C4}"/>
+              </a:ext>
+            </a:extLst>
+          </p:cNvPr>
+          <p:cNvPicPr>
+            <a:picLocks noChangeAspect="1"/>
+          </p:cNvPicPr>
+          <p:nvPr/>
+        </p:nvPicPr>
+        <p:blipFill>
+          <a:blip r:embed="rId2">
+            <a:extLst>
+              <a:ext uri="{28A0092B-C50C-407E-A947-70E740481C1C}">
+                <a14:useLocalDpi xmlns:a14="http://schemas.microsoft.com/office/drawing/2010/main" val="0"/>
+              </a:ext>
+              <a:ext uri="{96DAC541-7B7A-43D3-8B79-37D633B846F1}">
+                <asvg:svgBlip xmlns:asvg="http://schemas.microsoft.com/office/drawing/2016/SVG/main" r:embed="rId3"/>
+              </a:ext>
+            </a:extLst>
+          </a:blip>
+          <a:stretch>
+            <a:fillRect/>
+          </a:stretch>
+        </p:blipFill>
+        <p:spPr>
+          <a:xfrm>
+            <a:off x="3020267" y="0"/>
+            <a:ext cx="6151465" cy="6858000"/>
+          </a:xfrm>
+          <a:prstGeom prst="rect">
+            <a:avLst/>
+          </a:prstGeom>
+        </p:spPr>
+      </p:pic>
+    </p:spTree>
+    <p:extLst>
+      <p:ext uri="{BB962C8B-B14F-4D97-AF65-F5344CB8AC3E}">
+        <p14:creationId xmlns:p14="http://schemas.microsoft.com/office/powerpoint/2010/main" val="1458503390"/>
+      </p:ext>
+    </p:extLst>
+  </p:cSld>
+  <p:clrMapOvr>
+    <a:masterClrMapping/>
+  </p:clrMapOvr>
+</p:sld>
+</file>
+
+<file path=ppt/slides/slide13.xml><?xml version="1.0" encoding="utf-8"?>
+<p:sld xmlns:a="http://schemas.openxmlformats.org/drawingml/2006/main" xmlns:r="http://schemas.openxmlformats.org/officeDocument/2006/relationships" xmlns:p="http://schemas.openxmlformats.org/presentationml/2006/main">
+  <p:cSld>
+    <p:spTree>
+      <p:nvGrpSpPr>
+        <p:cNvPr id="1" name=""/>
+        <p:cNvGrpSpPr/>
+        <p:nvPr/>
+      </p:nvGrpSpPr>
+      <p:grpSpPr>
+        <a:xfrm>
+          <a:off x="0" y="0"/>
+          <a:ext cx="0" cy="0"/>
+          <a:chOff x="0" y="0"/>
+          <a:chExt cx="0" cy="0"/>
+        </a:xfrm>
+      </p:grpSpPr>
+      <p:sp>
+        <p:nvSpPr>
+          <p:cNvPr id="4" name="타원 3">
+            <a:extLst>
+              <a:ext uri="{FF2B5EF4-FFF2-40B4-BE49-F238E27FC236}">
+                <a16:creationId xmlns:a16="http://schemas.microsoft.com/office/drawing/2014/main" id="{6BEC0AAC-FE02-DF27-3A44-CD87A258999E}"/>
+              </a:ext>
+            </a:extLst>
+          </p:cNvPr>
+          <p:cNvSpPr/>
+          <p:nvPr/>
+        </p:nvSpPr>
+        <p:spPr>
+          <a:xfrm>
+            <a:off x="4749679" y="2738865"/>
+            <a:ext cx="1716126" cy="1716126"/>
+          </a:xfrm>
+          <a:prstGeom prst="ellipse">
+            <a:avLst/>
+          </a:prstGeom>
+        </p:spPr>
+        <p:style>
+          <a:lnRef idx="2">
+            <a:schemeClr val="accent1">
+              <a:shade val="50000"/>
+            </a:schemeClr>
+          </a:lnRef>
+          <a:fillRef idx="1">
+            <a:schemeClr val="accent1"/>
+          </a:fillRef>
+          <a:effectRef idx="0">
+            <a:schemeClr val="accent1"/>
+          </a:effectRef>
+          <a:fontRef idx="minor">
+            <a:schemeClr val="lt1"/>
+          </a:fontRef>
+        </p:style>
+        <p:txBody>
+          <a:bodyPr rtlCol="0" anchor="ctr"/>
+          <a:lstStyle/>
+          <a:p>
+            <a:pPr algn="ctr"/>
+            <a:endParaRPr lang="ko-KR" altLang="en-US"/>
+          </a:p>
+        </p:txBody>
+      </p:sp>
+      <p:sp>
+        <p:nvSpPr>
+          <p:cNvPr id="6" name="타원 5">
+            <a:extLst>
+              <a:ext uri="{FF2B5EF4-FFF2-40B4-BE49-F238E27FC236}">
+                <a16:creationId xmlns:a16="http://schemas.microsoft.com/office/drawing/2014/main" id="{F3166636-5269-EF3C-0EE9-F6D39995609A}"/>
+              </a:ext>
+            </a:extLst>
+          </p:cNvPr>
+          <p:cNvSpPr/>
+          <p:nvPr/>
+        </p:nvSpPr>
+        <p:spPr>
+          <a:xfrm>
+            <a:off x="5399727" y="3394331"/>
+            <a:ext cx="416030" cy="416030"/>
+          </a:xfrm>
+          <a:prstGeom prst="ellipse">
+            <a:avLst/>
+          </a:prstGeom>
+        </p:spPr>
+        <p:style>
+          <a:lnRef idx="2">
+            <a:schemeClr val="accent1">
+              <a:shade val="50000"/>
+            </a:schemeClr>
+          </a:lnRef>
+          <a:fillRef idx="1">
+            <a:schemeClr val="accent1"/>
+          </a:fillRef>
+          <a:effectRef idx="0">
+            <a:schemeClr val="accent1"/>
+          </a:effectRef>
+          <a:fontRef idx="minor">
+            <a:schemeClr val="lt1"/>
+          </a:fontRef>
+        </p:style>
+        <p:txBody>
+          <a:bodyPr rtlCol="0" anchor="ctr"/>
+          <a:lstStyle/>
+          <a:p>
+            <a:pPr algn="ctr"/>
+            <a:endParaRPr lang="ko-KR" altLang="en-US"/>
+          </a:p>
+        </p:txBody>
+      </p:sp>
     </p:spTree>
     <p:extLst>
       <p:ext uri="{BB962C8B-B14F-4D97-AF65-F5344CB8AC3E}">
@@ -4141,7 +5426,7 @@
 </p:sld>
 </file>
 
-<file path=ppt/slides/slide11.xml><?xml version="1.0" encoding="utf-8"?>
+<file path=ppt/slides/slide14.xml><?xml version="1.0" encoding="utf-8"?>
 <p:sld xmlns:a="http://schemas.openxmlformats.org/drawingml/2006/main" xmlns:r="http://schemas.openxmlformats.org/officeDocument/2006/relationships" xmlns:p="http://schemas.openxmlformats.org/presentationml/2006/main">
   <p:cSld>
     <p:bg>
@@ -9085,7 +10370,7 @@
           <a:p>
             <a:pPr algn="ctr"/>
             <a:r>
-              <a:rPr lang="en-US" altLang="ko-KR" sz="1400" dirty="0" err="1">
+              <a:rPr lang="en-US" altLang="ko-KR" sz="1200" dirty="0" err="1">
                 <a:solidFill>
                   <a:schemeClr val="bg1"/>
                 </a:solidFill>
@@ -9093,7 +10378,7 @@
               </a:rPr>
               <a:t>Soliely</a:t>
             </a:r>
-            <a:endParaRPr lang="en-US" altLang="ko-KR" sz="1800" dirty="0">
+            <a:endParaRPr lang="en-US" altLang="ko-KR" sz="1600" dirty="0">
               <a:solidFill>
                 <a:schemeClr val="bg1"/>
               </a:solidFill>
@@ -9103,7 +10388,7 @@
           <a:p>
             <a:pPr algn="ctr"/>
             <a:r>
-              <a:rPr lang="en-US" altLang="ko-KR" sz="2000" dirty="0">
+              <a:rPr lang="en-US" altLang="ko-KR" dirty="0">
                 <a:solidFill>
                   <a:schemeClr val="bg1"/>
                 </a:solidFill>
@@ -9111,7 +10396,7 @@
               </a:rPr>
               <a:t>Renatus</a:t>
             </a:r>
-            <a:endParaRPr lang="en-US" altLang="ko-KR" sz="1800" dirty="0">
+            <a:endParaRPr lang="en-US" altLang="ko-KR" sz="1600" dirty="0">
               <a:solidFill>
                 <a:schemeClr val="bg1"/>
               </a:solidFill>
@@ -9121,7 +10406,7 @@
           <a:p>
             <a:pPr algn="ctr"/>
             <a:r>
-              <a:rPr lang="en-US" altLang="ko-KR" sz="1800" dirty="0">
+              <a:rPr lang="en-US" altLang="ko-KR" sz="1600">
                 <a:solidFill>
                   <a:schemeClr val="bg1"/>
                 </a:solidFill>
@@ -9129,6 +10414,24 @@
               </a:rPr>
               <a:t>Normal</a:t>
             </a:r>
+          </a:p>
+          <a:p>
+            <a:pPr algn="ctr"/>
+            <a:r>
+              <a:rPr lang="en-US" altLang="ko-KR" sz="1200">
+                <a:solidFill>
+                  <a:schemeClr val="bg1"/>
+                </a:solidFill>
+                <a:latin typeface="Comic Sans MS" panose="030F0702030302020204" pitchFamily="66" charset="0"/>
+              </a:rPr>
+              <a:t>Gamu</a:t>
+            </a:r>
+            <a:endParaRPr lang="en-US" altLang="ko-KR" sz="1600" dirty="0">
+              <a:solidFill>
+                <a:schemeClr val="bg1"/>
+              </a:solidFill>
+              <a:latin typeface="Comic Sans MS" panose="030F0702030302020204" pitchFamily="66" charset="0"/>
+            </a:endParaRPr>
           </a:p>
         </p:txBody>
       </p:sp>
@@ -12061,7 +13364,7 @@
         </p:nvSpPr>
         <p:spPr>
           <a:xfrm>
-            <a:off x="7145744" y="361932"/>
+            <a:off x="7145744" y="322176"/>
             <a:ext cx="1308097" cy="411660"/>
           </a:xfrm>
           <a:prstGeom prst="roundRect">
@@ -12094,25 +13397,7 @@
           <a:p>
             <a:pPr algn="r"/>
             <a:r>
-              <a:rPr lang="en-US" altLang="ko-KR" sz="1200" dirty="0" err="1">
-                <a:solidFill>
-                  <a:schemeClr val="tx1"/>
-                </a:solidFill>
-                <a:latin typeface="Comic Sans MS" panose="030F0702030302020204" pitchFamily="66" charset="0"/>
-              </a:rPr>
-              <a:t>Gamu</a:t>
-            </a:r>
-            <a:endParaRPr lang="en-US" altLang="ko-KR" sz="1200" dirty="0">
-              <a:solidFill>
-                <a:schemeClr val="tx1"/>
-              </a:solidFill>
-              <a:latin typeface="Comic Sans MS" panose="030F0702030302020204" pitchFamily="66" charset="0"/>
-            </a:endParaRPr>
-          </a:p>
-          <a:p>
-            <a:pPr algn="r"/>
-            <a:r>
-              <a:rPr lang="ko-KR" altLang="en-US" sz="1200" dirty="0">
+              <a:rPr lang="ko-KR" altLang="en-US" sz="1200">
                 <a:solidFill>
                   <a:schemeClr val="tx1"/>
                 </a:solidFill>
@@ -23658,6 +24943,651 @@
     <p:bg>
       <p:bgPr>
         <a:solidFill>
+          <a:schemeClr val="accent4"/>
+        </a:solidFill>
+        <a:effectLst/>
+      </p:bgPr>
+    </p:bg>
+    <p:spTree>
+      <p:nvGrpSpPr>
+        <p:cNvPr id="1" name=""/>
+        <p:cNvGrpSpPr/>
+        <p:nvPr/>
+      </p:nvGrpSpPr>
+      <p:grpSpPr>
+        <a:xfrm>
+          <a:off x="0" y="0"/>
+          <a:ext cx="0" cy="0"/>
+          <a:chOff x="0" y="0"/>
+          <a:chExt cx="0" cy="0"/>
+        </a:xfrm>
+      </p:grpSpPr>
+      <p:pic>
+        <p:nvPicPr>
+          <p:cNvPr id="3" name="그래픽 2">
+            <a:extLst>
+              <a:ext uri="{FF2B5EF4-FFF2-40B4-BE49-F238E27FC236}">
+                <a16:creationId xmlns:a16="http://schemas.microsoft.com/office/drawing/2014/main" id="{D466E050-9399-05AC-A674-782ECFDD829E}"/>
+              </a:ext>
+            </a:extLst>
+          </p:cNvPr>
+          <p:cNvPicPr>
+            <a:picLocks noChangeAspect="1"/>
+          </p:cNvPicPr>
+          <p:nvPr/>
+        </p:nvPicPr>
+        <p:blipFill>
+          <a:blip r:embed="rId2">
+            <a:extLst>
+              <a:ext uri="{28A0092B-C50C-407E-A947-70E740481C1C}">
+                <a14:useLocalDpi xmlns:a14="http://schemas.microsoft.com/office/drawing/2010/main" val="0"/>
+              </a:ext>
+              <a:ext uri="{96DAC541-7B7A-43D3-8B79-37D633B846F1}">
+                <asvg:svgBlip xmlns:asvg="http://schemas.microsoft.com/office/drawing/2016/SVG/main" r:embed="rId3"/>
+              </a:ext>
+            </a:extLst>
+          </a:blip>
+          <a:stretch>
+            <a:fillRect/>
+          </a:stretch>
+        </p:blipFill>
+        <p:spPr>
+          <a:xfrm>
+            <a:off x="3020267" y="0"/>
+            <a:ext cx="6151465" cy="6858000"/>
+          </a:xfrm>
+          <a:prstGeom prst="rect">
+            <a:avLst/>
+          </a:prstGeom>
+        </p:spPr>
+      </p:pic>
+      <p:sp>
+        <p:nvSpPr>
+          <p:cNvPr id="2" name="사각형: 둥근 모서리 1">
+            <a:extLst>
+              <a:ext uri="{FF2B5EF4-FFF2-40B4-BE49-F238E27FC236}">
+                <a16:creationId xmlns:a16="http://schemas.microsoft.com/office/drawing/2014/main" id="{73B70AB6-1D94-9A33-5633-A21E4D2DEBDF}"/>
+              </a:ext>
+            </a:extLst>
+          </p:cNvPr>
+          <p:cNvSpPr/>
+          <p:nvPr/>
+        </p:nvSpPr>
+        <p:spPr>
+          <a:xfrm>
+            <a:off x="1564691" y="4138125"/>
+            <a:ext cx="4731798" cy="1118586"/>
+          </a:xfrm>
+          <a:prstGeom prst="roundRect">
+            <a:avLst>
+              <a:gd name="adj" fmla="val 0"/>
+            </a:avLst>
+          </a:prstGeom>
+          <a:solidFill>
+            <a:srgbClr val="A5A5A5">
+              <a:alpha val="74902"/>
+            </a:srgbClr>
+          </a:solidFill>
+          <a:ln>
+            <a:noFill/>
+          </a:ln>
+        </p:spPr>
+        <p:style>
+          <a:lnRef idx="2">
+            <a:schemeClr val="accent3">
+              <a:shade val="50000"/>
+            </a:schemeClr>
+          </a:lnRef>
+          <a:fillRef idx="1">
+            <a:schemeClr val="accent3"/>
+          </a:fillRef>
+          <a:effectRef idx="0">
+            <a:schemeClr val="accent3"/>
+          </a:effectRef>
+          <a:fontRef idx="minor">
+            <a:schemeClr val="lt1"/>
+          </a:fontRef>
+        </p:style>
+        <p:txBody>
+          <a:bodyPr rtlCol="0" anchor="ctr"/>
+          <a:lstStyle/>
+          <a:p>
+            <a:pPr algn="ctr"/>
+            <a:r>
+              <a:rPr lang="en-US" altLang="ko-KR"/>
+              <a:t>Hello</a:t>
+            </a:r>
+            <a:endParaRPr lang="ko-KR" altLang="en-US"/>
+          </a:p>
+        </p:txBody>
+      </p:sp>
+    </p:spTree>
+    <p:extLst>
+      <p:ext uri="{BB962C8B-B14F-4D97-AF65-F5344CB8AC3E}">
+        <p14:creationId xmlns:p14="http://schemas.microsoft.com/office/powerpoint/2010/main" val="1127730400"/>
+      </p:ext>
+    </p:extLst>
+  </p:cSld>
+  <p:clrMapOvr>
+    <a:masterClrMapping/>
+  </p:clrMapOvr>
+</p:sld>
+</file>
+
+<file path=ppt/slides/slide6.xml><?xml version="1.0" encoding="utf-8"?>
+<p:sld xmlns:a="http://schemas.openxmlformats.org/drawingml/2006/main" xmlns:r="http://schemas.openxmlformats.org/officeDocument/2006/relationships" xmlns:p="http://schemas.openxmlformats.org/presentationml/2006/main">
+  <p:cSld>
+    <p:bg>
+      <p:bgPr>
+        <a:solidFill>
+          <a:schemeClr val="bg1"/>
+        </a:solidFill>
+        <a:effectLst/>
+      </p:bgPr>
+    </p:bg>
+    <p:spTree>
+      <p:nvGrpSpPr>
+        <p:cNvPr id="1" name=""/>
+        <p:cNvGrpSpPr/>
+        <p:nvPr/>
+      </p:nvGrpSpPr>
+      <p:grpSpPr>
+        <a:xfrm>
+          <a:off x="0" y="0"/>
+          <a:ext cx="0" cy="0"/>
+          <a:chOff x="0" y="0"/>
+          <a:chExt cx="0" cy="0"/>
+        </a:xfrm>
+      </p:grpSpPr>
+      <p:sp>
+        <p:nvSpPr>
+          <p:cNvPr id="8" name="Rectangle 7">
+            <a:extLst>
+              <a:ext uri="{FF2B5EF4-FFF2-40B4-BE49-F238E27FC236}">
+                <a16:creationId xmlns:a16="http://schemas.microsoft.com/office/drawing/2014/main" id="{42A4FC2C-047E-45A5-965D-8E1E3BF09BC6}"/>
+              </a:ext>
+              <a:ext uri="{C183D7F6-B498-43B3-948B-1728B52AA6E4}">
+                <adec:decorative xmlns:adec="http://schemas.microsoft.com/office/drawing/2017/decorative" val="1"/>
+              </a:ext>
+            </a:extLst>
+          </p:cNvPr>
+          <p:cNvSpPr>
+            <a:spLocks noGrp="1" noRot="1" noChangeAspect="1" noMove="1" noResize="1" noEditPoints="1" noAdjustHandles="1" noChangeArrowheads="1" noChangeShapeType="1" noTextEdit="1"/>
+          </p:cNvSpPr>
+          <p:nvPr>
+            <p:extLst>
+              <p:ext uri="{386F3935-93C4-4BCD-93E2-E3B085C9AB24}">
+                <p16:designElem xmlns:p16="http://schemas.microsoft.com/office/powerpoint/2015/main" val="1"/>
+              </p:ext>
+            </p:extLst>
+          </p:nvPr>
+        </p:nvSpPr>
+        <p:spPr bwMode="white">
+          <a:xfrm>
+            <a:off x="1524" y="0"/>
+            <a:ext cx="12188952" cy="6858000"/>
+          </a:xfrm>
+          <a:prstGeom prst="rect">
+            <a:avLst/>
+          </a:prstGeom>
+          <a:noFill/>
+          <a:ln>
+            <a:noFill/>
+          </a:ln>
+        </p:spPr>
+        <p:style>
+          <a:lnRef idx="2">
+            <a:schemeClr val="accent1">
+              <a:shade val="50000"/>
+            </a:schemeClr>
+          </a:lnRef>
+          <a:fillRef idx="1">
+            <a:schemeClr val="accent1"/>
+          </a:fillRef>
+          <a:effectRef idx="0">
+            <a:schemeClr val="accent1"/>
+          </a:effectRef>
+          <a:fontRef idx="minor">
+            <a:schemeClr val="lt1"/>
+          </a:fontRef>
+        </p:style>
+        <p:txBody>
+          <a:bodyPr rtlCol="0" anchor="ctr"/>
+          <a:lstStyle>
+            <a:defPPr>
+              <a:defRPr lang="en-US"/>
+            </a:defPPr>
+            <a:lvl1pPr marL="0" algn="l" defTabSz="914400" rtl="0" eaLnBrk="1" latinLnBrk="0" hangingPunct="1">
+              <a:defRPr sz="1800" kern="1200">
+                <a:solidFill>
+                  <a:schemeClr val="lt1"/>
+                </a:solidFill>
+                <a:latin typeface="+mn-lt"/>
+                <a:ea typeface="+mn-ea"/>
+                <a:cs typeface="+mn-cs"/>
+              </a:defRPr>
+            </a:lvl1pPr>
+            <a:lvl2pPr marL="457200" algn="l" defTabSz="914400" rtl="0" eaLnBrk="1" latinLnBrk="0" hangingPunct="1">
+              <a:defRPr sz="1800" kern="1200">
+                <a:solidFill>
+                  <a:schemeClr val="lt1"/>
+                </a:solidFill>
+                <a:latin typeface="+mn-lt"/>
+                <a:ea typeface="+mn-ea"/>
+                <a:cs typeface="+mn-cs"/>
+              </a:defRPr>
+            </a:lvl2pPr>
+            <a:lvl3pPr marL="914400" algn="l" defTabSz="914400" rtl="0" eaLnBrk="1" latinLnBrk="0" hangingPunct="1">
+              <a:defRPr sz="1800" kern="1200">
+                <a:solidFill>
+                  <a:schemeClr val="lt1"/>
+                </a:solidFill>
+                <a:latin typeface="+mn-lt"/>
+                <a:ea typeface="+mn-ea"/>
+                <a:cs typeface="+mn-cs"/>
+              </a:defRPr>
+            </a:lvl3pPr>
+            <a:lvl4pPr marL="1371600" algn="l" defTabSz="914400" rtl="0" eaLnBrk="1" latinLnBrk="0" hangingPunct="1">
+              <a:defRPr sz="1800" kern="1200">
+                <a:solidFill>
+                  <a:schemeClr val="lt1"/>
+                </a:solidFill>
+                <a:latin typeface="+mn-lt"/>
+                <a:ea typeface="+mn-ea"/>
+                <a:cs typeface="+mn-cs"/>
+              </a:defRPr>
+            </a:lvl4pPr>
+            <a:lvl5pPr marL="1828800" algn="l" defTabSz="914400" rtl="0" eaLnBrk="1" latinLnBrk="0" hangingPunct="1">
+              <a:defRPr sz="1800" kern="1200">
+                <a:solidFill>
+                  <a:schemeClr val="lt1"/>
+                </a:solidFill>
+                <a:latin typeface="+mn-lt"/>
+                <a:ea typeface="+mn-ea"/>
+                <a:cs typeface="+mn-cs"/>
+              </a:defRPr>
+            </a:lvl5pPr>
+            <a:lvl6pPr marL="2286000" algn="l" defTabSz="914400" rtl="0" eaLnBrk="1" latinLnBrk="0" hangingPunct="1">
+              <a:defRPr sz="1800" kern="1200">
+                <a:solidFill>
+                  <a:schemeClr val="lt1"/>
+                </a:solidFill>
+                <a:latin typeface="+mn-lt"/>
+                <a:ea typeface="+mn-ea"/>
+                <a:cs typeface="+mn-cs"/>
+              </a:defRPr>
+            </a:lvl6pPr>
+            <a:lvl7pPr marL="2743200" algn="l" defTabSz="914400" rtl="0" eaLnBrk="1" latinLnBrk="0" hangingPunct="1">
+              <a:defRPr sz="1800" kern="1200">
+                <a:solidFill>
+                  <a:schemeClr val="lt1"/>
+                </a:solidFill>
+                <a:latin typeface="+mn-lt"/>
+                <a:ea typeface="+mn-ea"/>
+                <a:cs typeface="+mn-cs"/>
+              </a:defRPr>
+            </a:lvl7pPr>
+            <a:lvl8pPr marL="3200400" algn="l" defTabSz="914400" rtl="0" eaLnBrk="1" latinLnBrk="0" hangingPunct="1">
+              <a:defRPr sz="1800" kern="1200">
+                <a:solidFill>
+                  <a:schemeClr val="lt1"/>
+                </a:solidFill>
+                <a:latin typeface="+mn-lt"/>
+                <a:ea typeface="+mn-ea"/>
+                <a:cs typeface="+mn-cs"/>
+              </a:defRPr>
+            </a:lvl8pPr>
+            <a:lvl9pPr marL="3657600" algn="l" defTabSz="914400" rtl="0" eaLnBrk="1" latinLnBrk="0" hangingPunct="1">
+              <a:defRPr sz="1800" kern="1200">
+                <a:solidFill>
+                  <a:schemeClr val="lt1"/>
+                </a:solidFill>
+                <a:latin typeface="+mn-lt"/>
+                <a:ea typeface="+mn-ea"/>
+                <a:cs typeface="+mn-cs"/>
+              </a:defRPr>
+            </a:lvl9pPr>
+          </a:lstStyle>
+          <a:p>
+            <a:pPr algn="ctr"/>
+            <a:endParaRPr lang="en-US"/>
+          </a:p>
+        </p:txBody>
+      </p:sp>
+      <p:sp>
+        <p:nvSpPr>
+          <p:cNvPr id="4" name="사각형: 둥근 모서리 3">
+            <a:extLst>
+              <a:ext uri="{FF2B5EF4-FFF2-40B4-BE49-F238E27FC236}">
+                <a16:creationId xmlns:a16="http://schemas.microsoft.com/office/drawing/2014/main" id="{06531FB0-C27C-4197-5834-5C93592CE6D0}"/>
+              </a:ext>
+            </a:extLst>
+          </p:cNvPr>
+          <p:cNvSpPr/>
+          <p:nvPr/>
+        </p:nvSpPr>
+        <p:spPr>
+          <a:xfrm>
+            <a:off x="0" y="2026404"/>
+            <a:ext cx="4731798" cy="1118586"/>
+          </a:xfrm>
+          <a:prstGeom prst="roundRect">
+            <a:avLst>
+              <a:gd name="adj" fmla="val 0"/>
+            </a:avLst>
+          </a:prstGeom>
+          <a:solidFill>
+            <a:srgbClr val="808080">
+              <a:alpha val="50196"/>
+            </a:srgbClr>
+          </a:solidFill>
+          <a:ln>
+            <a:noFill/>
+          </a:ln>
+        </p:spPr>
+        <p:style>
+          <a:lnRef idx="2">
+            <a:schemeClr val="accent3">
+              <a:shade val="50000"/>
+            </a:schemeClr>
+          </a:lnRef>
+          <a:fillRef idx="1">
+            <a:schemeClr val="accent3"/>
+          </a:fillRef>
+          <a:effectRef idx="0">
+            <a:schemeClr val="accent3"/>
+          </a:effectRef>
+          <a:fontRef idx="minor">
+            <a:schemeClr val="lt1"/>
+          </a:fontRef>
+        </p:style>
+        <p:txBody>
+          <a:bodyPr rtlCol="0" anchor="ctr"/>
+          <a:lstStyle/>
+          <a:p>
+            <a:pPr algn="ctr"/>
+            <a:r>
+              <a:rPr lang="en-US" altLang="ko-KR"/>
+              <a:t>MuangMuangE</a:t>
+            </a:r>
+            <a:endParaRPr lang="ko-KR" altLang="en-US"/>
+          </a:p>
+        </p:txBody>
+      </p:sp>
+      <p:sp>
+        <p:nvSpPr>
+          <p:cNvPr id="5" name="사각형: 둥근 모서리 4">
+            <a:extLst>
+              <a:ext uri="{FF2B5EF4-FFF2-40B4-BE49-F238E27FC236}">
+                <a16:creationId xmlns:a16="http://schemas.microsoft.com/office/drawing/2014/main" id="{39519D81-76B0-5B6E-AF21-201D56849930}"/>
+              </a:ext>
+            </a:extLst>
+          </p:cNvPr>
+          <p:cNvSpPr/>
+          <p:nvPr/>
+        </p:nvSpPr>
+        <p:spPr>
+          <a:xfrm>
+            <a:off x="0" y="907818"/>
+            <a:ext cx="4731798" cy="1118586"/>
+          </a:xfrm>
+          <a:prstGeom prst="roundRect">
+            <a:avLst>
+              <a:gd name="adj" fmla="val 0"/>
+            </a:avLst>
+          </a:prstGeom>
+          <a:solidFill>
+            <a:srgbClr val="606060">
+              <a:alpha val="49804"/>
+            </a:srgbClr>
+          </a:solidFill>
+          <a:ln>
+            <a:noFill/>
+          </a:ln>
+        </p:spPr>
+        <p:style>
+          <a:lnRef idx="2">
+            <a:schemeClr val="accent3">
+              <a:shade val="50000"/>
+            </a:schemeClr>
+          </a:lnRef>
+          <a:fillRef idx="1">
+            <a:schemeClr val="accent3"/>
+          </a:fillRef>
+          <a:effectRef idx="0">
+            <a:schemeClr val="accent3"/>
+          </a:effectRef>
+          <a:fontRef idx="minor">
+            <a:schemeClr val="lt1"/>
+          </a:fontRef>
+        </p:style>
+        <p:txBody>
+          <a:bodyPr rtlCol="0" anchor="ctr"/>
+          <a:lstStyle/>
+          <a:p>
+            <a:pPr algn="ctr"/>
+            <a:r>
+              <a:rPr lang="en-US" altLang="ko-KR"/>
+              <a:t>MuangMuangE</a:t>
+            </a:r>
+            <a:endParaRPr lang="ko-KR" altLang="en-US"/>
+          </a:p>
+        </p:txBody>
+      </p:sp>
+    </p:spTree>
+    <p:extLst>
+      <p:ext uri="{BB962C8B-B14F-4D97-AF65-F5344CB8AC3E}">
+        <p14:creationId xmlns:p14="http://schemas.microsoft.com/office/powerpoint/2010/main" val="1054180590"/>
+      </p:ext>
+    </p:extLst>
+  </p:cSld>
+  <p:clrMapOvr>
+    <a:masterClrMapping/>
+  </p:clrMapOvr>
+</p:sld>
+</file>
+
+<file path=ppt/slides/slide7.xml><?xml version="1.0" encoding="utf-8"?>
+<p:sld xmlns:a="http://schemas.openxmlformats.org/drawingml/2006/main" xmlns:r="http://schemas.openxmlformats.org/officeDocument/2006/relationships" xmlns:p="http://schemas.openxmlformats.org/presentationml/2006/main">
+  <p:cSld>
+    <p:spTree>
+      <p:nvGrpSpPr>
+        <p:cNvPr id="1" name=""/>
+        <p:cNvGrpSpPr/>
+        <p:nvPr/>
+      </p:nvGrpSpPr>
+      <p:grpSpPr>
+        <a:xfrm>
+          <a:off x="0" y="0"/>
+          <a:ext cx="0" cy="0"/>
+          <a:chOff x="0" y="0"/>
+          <a:chExt cx="0" cy="0"/>
+        </a:xfrm>
+      </p:grpSpPr>
+      <p:pic>
+        <p:nvPicPr>
+          <p:cNvPr id="6" name="그림 5">
+            <a:extLst>
+              <a:ext uri="{FF2B5EF4-FFF2-40B4-BE49-F238E27FC236}">
+                <a16:creationId xmlns:a16="http://schemas.microsoft.com/office/drawing/2014/main" id="{6FF1A87D-AD76-1EAE-0DCB-E92874A5EA14}"/>
+              </a:ext>
+            </a:extLst>
+          </p:cNvPr>
+          <p:cNvPicPr>
+            <a:picLocks noChangeAspect="1"/>
+          </p:cNvPicPr>
+          <p:nvPr/>
+        </p:nvPicPr>
+        <p:blipFill>
+          <a:blip r:embed="rId2">
+            <a:extLst>
+              <a:ext uri="{BEBA8EAE-BF5A-486C-A8C5-ECC9F3942E4B}">
+                <a14:imgProps xmlns:a14="http://schemas.microsoft.com/office/drawing/2010/main">
+                  <a14:imgLayer r:embed="rId3">
+                    <a14:imgEffect>
+                      <a14:brightnessContrast bright="-40000"/>
+                    </a14:imgEffect>
+                  </a14:imgLayer>
+                </a14:imgProps>
+              </a:ext>
+              <a:ext uri="{28A0092B-C50C-407E-A947-70E740481C1C}">
+                <a14:useLocalDpi xmlns:a14="http://schemas.microsoft.com/office/drawing/2010/main" val="0"/>
+              </a:ext>
+            </a:extLst>
+          </a:blip>
+          <a:stretch>
+            <a:fillRect/>
+          </a:stretch>
+        </p:blipFill>
+        <p:spPr>
+          <a:xfrm>
+            <a:off x="0" y="0"/>
+            <a:ext cx="12192000" cy="6858000"/>
+          </a:xfrm>
+          <a:prstGeom prst="rect">
+            <a:avLst/>
+          </a:prstGeom>
+        </p:spPr>
+      </p:pic>
+      <p:sp>
+        <p:nvSpPr>
+          <p:cNvPr id="9" name="사각형: 둥근 모서리 8">
+            <a:extLst>
+              <a:ext uri="{FF2B5EF4-FFF2-40B4-BE49-F238E27FC236}">
+                <a16:creationId xmlns:a16="http://schemas.microsoft.com/office/drawing/2014/main" id="{67EF1A14-94A1-84E9-74CE-C14EDC880BE6}"/>
+              </a:ext>
+            </a:extLst>
+          </p:cNvPr>
+          <p:cNvSpPr/>
+          <p:nvPr/>
+        </p:nvSpPr>
+        <p:spPr>
+          <a:xfrm>
+            <a:off x="0" y="2026404"/>
+            <a:ext cx="4731798" cy="1118586"/>
+          </a:xfrm>
+          <a:prstGeom prst="roundRect">
+            <a:avLst>
+              <a:gd name="adj" fmla="val 0"/>
+            </a:avLst>
+          </a:prstGeom>
+          <a:solidFill>
+            <a:srgbClr val="808080">
+              <a:alpha val="50196"/>
+            </a:srgbClr>
+          </a:solidFill>
+          <a:ln>
+            <a:noFill/>
+          </a:ln>
+        </p:spPr>
+        <p:style>
+          <a:lnRef idx="2">
+            <a:schemeClr val="accent3">
+              <a:shade val="50000"/>
+            </a:schemeClr>
+          </a:lnRef>
+          <a:fillRef idx="1">
+            <a:schemeClr val="accent3"/>
+          </a:fillRef>
+          <a:effectRef idx="0">
+            <a:schemeClr val="accent3"/>
+          </a:effectRef>
+          <a:fontRef idx="minor">
+            <a:schemeClr val="lt1"/>
+          </a:fontRef>
+        </p:style>
+        <p:txBody>
+          <a:bodyPr rtlCol="0" anchor="ctr"/>
+          <a:lstStyle/>
+          <a:p>
+            <a:pPr algn="ctr"/>
+            <a:r>
+              <a:rPr lang="en-US" altLang="ko-KR"/>
+              <a:t>MuangMuangE</a:t>
+            </a:r>
+            <a:endParaRPr lang="ko-KR" altLang="en-US"/>
+          </a:p>
+        </p:txBody>
+      </p:sp>
+      <p:sp>
+        <p:nvSpPr>
+          <p:cNvPr id="10" name="사각형: 둥근 모서리 9">
+            <a:extLst>
+              <a:ext uri="{FF2B5EF4-FFF2-40B4-BE49-F238E27FC236}">
+                <a16:creationId xmlns:a16="http://schemas.microsoft.com/office/drawing/2014/main" id="{D454A6AF-0F9A-53B5-25D3-C3A78F2569B3}"/>
+              </a:ext>
+            </a:extLst>
+          </p:cNvPr>
+          <p:cNvSpPr/>
+          <p:nvPr/>
+        </p:nvSpPr>
+        <p:spPr>
+          <a:xfrm>
+            <a:off x="0" y="907818"/>
+            <a:ext cx="4731798" cy="1118586"/>
+          </a:xfrm>
+          <a:prstGeom prst="roundRect">
+            <a:avLst>
+              <a:gd name="adj" fmla="val 0"/>
+            </a:avLst>
+          </a:prstGeom>
+          <a:solidFill>
+            <a:srgbClr val="606060">
+              <a:alpha val="49804"/>
+            </a:srgbClr>
+          </a:solidFill>
+          <a:ln>
+            <a:noFill/>
+          </a:ln>
+        </p:spPr>
+        <p:style>
+          <a:lnRef idx="2">
+            <a:schemeClr val="accent3">
+              <a:shade val="50000"/>
+            </a:schemeClr>
+          </a:lnRef>
+          <a:fillRef idx="1">
+            <a:schemeClr val="accent3"/>
+          </a:fillRef>
+          <a:effectRef idx="0">
+            <a:schemeClr val="accent3"/>
+          </a:effectRef>
+          <a:fontRef idx="minor">
+            <a:schemeClr val="lt1"/>
+          </a:fontRef>
+        </p:style>
+        <p:txBody>
+          <a:bodyPr rtlCol="0" anchor="ctr"/>
+          <a:lstStyle/>
+          <a:p>
+            <a:pPr algn="ctr"/>
+            <a:r>
+              <a:rPr lang="en-US" altLang="ko-KR"/>
+              <a:t>MuangMuangE</a:t>
+            </a:r>
+            <a:endParaRPr lang="ko-KR" altLang="en-US"/>
+          </a:p>
+        </p:txBody>
+      </p:sp>
+    </p:spTree>
+    <p:extLst>
+      <p:ext uri="{BB962C8B-B14F-4D97-AF65-F5344CB8AC3E}">
+        <p14:creationId xmlns:p14="http://schemas.microsoft.com/office/powerpoint/2010/main" val="1658710548"/>
+      </p:ext>
+    </p:extLst>
+  </p:cSld>
+  <p:clrMapOvr>
+    <a:masterClrMapping/>
+  </p:clrMapOvr>
+</p:sld>
+</file>
+
+<file path=ppt/slides/slide8.xml><?xml version="1.0" encoding="utf-8"?>
+<p:sld xmlns:a="http://schemas.openxmlformats.org/drawingml/2006/main" xmlns:r="http://schemas.openxmlformats.org/officeDocument/2006/relationships" xmlns:p="http://schemas.openxmlformats.org/presentationml/2006/main">
+  <p:cSld>
+    <p:bg>
+      <p:bgPr>
+        <a:solidFill>
           <a:schemeClr val="tx1"/>
         </a:solidFill>
         <a:effectLst/>
@@ -24556,7 +26486,7 @@
 </p:sld>
 </file>
 
-<file path=ppt/slides/slide6.xml><?xml version="1.0" encoding="utf-8"?>
+<file path=ppt/slides/slide9.xml><?xml version="1.0" encoding="utf-8"?>
 <p:sld xmlns:a="http://schemas.openxmlformats.org/drawingml/2006/main" xmlns:r="http://schemas.openxmlformats.org/officeDocument/2006/relationships" xmlns:p="http://schemas.openxmlformats.org/presentationml/2006/main">
   <p:cSld>
     <p:spTree>
@@ -24831,1288 +26761,6 @@
     <p:extLst>
       <p:ext uri="{BB962C8B-B14F-4D97-AF65-F5344CB8AC3E}">
         <p14:creationId xmlns:p14="http://schemas.microsoft.com/office/powerpoint/2010/main" val="2317737549"/>
-      </p:ext>
-    </p:extLst>
-  </p:cSld>
-  <p:clrMapOvr>
-    <a:masterClrMapping/>
-  </p:clrMapOvr>
-</p:sld>
-</file>
-
-<file path=ppt/slides/slide7.xml><?xml version="1.0" encoding="utf-8"?>
-<p:sld xmlns:a="http://schemas.openxmlformats.org/drawingml/2006/main" xmlns:r="http://schemas.openxmlformats.org/officeDocument/2006/relationships" xmlns:p="http://schemas.openxmlformats.org/presentationml/2006/main">
-  <p:cSld>
-    <p:spTree>
-      <p:nvGrpSpPr>
-        <p:cNvPr id="1" name=""/>
-        <p:cNvGrpSpPr/>
-        <p:nvPr/>
-      </p:nvGrpSpPr>
-      <p:grpSpPr>
-        <a:xfrm>
-          <a:off x="0" y="0"/>
-          <a:ext cx="0" cy="0"/>
-          <a:chOff x="0" y="0"/>
-          <a:chExt cx="0" cy="0"/>
-        </a:xfrm>
-      </p:grpSpPr>
-      <p:sp>
-        <p:nvSpPr>
-          <p:cNvPr id="3" name="자유형: 도형 2">
-            <a:extLst>
-              <a:ext uri="{FF2B5EF4-FFF2-40B4-BE49-F238E27FC236}">
-                <a16:creationId xmlns:a16="http://schemas.microsoft.com/office/drawing/2014/main" id="{D7BEE3F0-B4DD-5654-3E15-D7C68DCB4F79}"/>
-              </a:ext>
-            </a:extLst>
-          </p:cNvPr>
-          <p:cNvSpPr/>
-          <p:nvPr/>
-        </p:nvSpPr>
-        <p:spPr>
-          <a:xfrm flipV="1">
-            <a:off x="0" y="5524500"/>
-            <a:ext cx="4311941" cy="1294528"/>
-          </a:xfrm>
-          <a:custGeom>
-            <a:avLst/>
-            <a:gdLst>
-              <a:gd name="connsiteX0" fmla="*/ 0 w 4311941"/>
-              <a:gd name="connsiteY0" fmla="*/ 1283516 h 1327406"/>
-              <a:gd name="connsiteX1" fmla="*/ 1996580 w 4311941"/>
-              <a:gd name="connsiteY1" fmla="*/ 1266738 h 1327406"/>
-              <a:gd name="connsiteX2" fmla="*/ 3028426 w 4311941"/>
-              <a:gd name="connsiteY2" fmla="*/ 696286 h 1327406"/>
-              <a:gd name="connsiteX3" fmla="*/ 4009938 w 4311941"/>
-              <a:gd name="connsiteY3" fmla="*/ 352338 h 1327406"/>
-              <a:gd name="connsiteX4" fmla="*/ 4311941 w 4311941"/>
-              <a:gd name="connsiteY4" fmla="*/ 0 h 1327406"/>
-              <a:gd name="connsiteX0" fmla="*/ 0 w 4311941"/>
-              <a:gd name="connsiteY0" fmla="*/ 1283516 h 1314688"/>
-              <a:gd name="connsiteX1" fmla="*/ 1996580 w 4311941"/>
-              <a:gd name="connsiteY1" fmla="*/ 1266738 h 1314688"/>
-              <a:gd name="connsiteX2" fmla="*/ 3028426 w 4311941"/>
-              <a:gd name="connsiteY2" fmla="*/ 696286 h 1314688"/>
-              <a:gd name="connsiteX3" fmla="*/ 4009938 w 4311941"/>
-              <a:gd name="connsiteY3" fmla="*/ 352338 h 1314688"/>
-              <a:gd name="connsiteX4" fmla="*/ 4311941 w 4311941"/>
-              <a:gd name="connsiteY4" fmla="*/ 0 h 1314688"/>
-              <a:gd name="connsiteX0" fmla="*/ 0 w 4311941"/>
-              <a:gd name="connsiteY0" fmla="*/ 1283516 h 1294528"/>
-              <a:gd name="connsiteX1" fmla="*/ 1996580 w 4311941"/>
-              <a:gd name="connsiteY1" fmla="*/ 1233182 h 1294528"/>
-              <a:gd name="connsiteX2" fmla="*/ 3028426 w 4311941"/>
-              <a:gd name="connsiteY2" fmla="*/ 696286 h 1294528"/>
-              <a:gd name="connsiteX3" fmla="*/ 4009938 w 4311941"/>
-              <a:gd name="connsiteY3" fmla="*/ 352338 h 1294528"/>
-              <a:gd name="connsiteX4" fmla="*/ 4311941 w 4311941"/>
-              <a:gd name="connsiteY4" fmla="*/ 0 h 1294528"/>
-            </a:gdLst>
-            <a:ahLst/>
-            <a:cxnLst>
-              <a:cxn ang="0">
-                <a:pos x="connsiteX0" y="connsiteY0"/>
-              </a:cxn>
-              <a:cxn ang="0">
-                <a:pos x="connsiteX1" y="connsiteY1"/>
-              </a:cxn>
-              <a:cxn ang="0">
-                <a:pos x="connsiteX2" y="connsiteY2"/>
-              </a:cxn>
-              <a:cxn ang="0">
-                <a:pos x="connsiteX3" y="connsiteY3"/>
-              </a:cxn>
-              <a:cxn ang="0">
-                <a:pos x="connsiteX4" y="connsiteY4"/>
-              </a:cxn>
-            </a:cxnLst>
-            <a:rect l="l" t="t" r="r" b="b"/>
-            <a:pathLst>
-              <a:path w="4311941" h="1294528">
-                <a:moveTo>
-                  <a:pt x="0" y="1283516"/>
-                </a:moveTo>
-                <a:cubicBezTo>
-                  <a:pt x="729143" y="1282118"/>
-                  <a:pt x="1491842" y="1331054"/>
-                  <a:pt x="1996580" y="1233182"/>
-                </a:cubicBezTo>
-                <a:cubicBezTo>
-                  <a:pt x="2501318" y="1135310"/>
-                  <a:pt x="2692866" y="843093"/>
-                  <a:pt x="3028426" y="696286"/>
-                </a:cubicBezTo>
-                <a:cubicBezTo>
-                  <a:pt x="3363986" y="549479"/>
-                  <a:pt x="3796019" y="468386"/>
-                  <a:pt x="4009938" y="352338"/>
-                </a:cubicBezTo>
-                <a:cubicBezTo>
-                  <a:pt x="4223857" y="236290"/>
-                  <a:pt x="4263005" y="57325"/>
-                  <a:pt x="4311941" y="0"/>
-                </a:cubicBezTo>
-              </a:path>
-            </a:pathLst>
-          </a:custGeom>
-          <a:noFill/>
-        </p:spPr>
-        <p:style>
-          <a:lnRef idx="2">
-            <a:schemeClr val="accent1">
-              <a:shade val="50000"/>
-            </a:schemeClr>
-          </a:lnRef>
-          <a:fillRef idx="1">
-            <a:schemeClr val="accent1"/>
-          </a:fillRef>
-          <a:effectRef idx="0">
-            <a:schemeClr val="accent1"/>
-          </a:effectRef>
-          <a:fontRef idx="minor">
-            <a:schemeClr val="lt1"/>
-          </a:fontRef>
-        </p:style>
-        <p:txBody>
-          <a:bodyPr rtlCol="0" anchor="ctr"/>
-          <a:lstStyle/>
-          <a:p>
-            <a:pPr algn="ctr"/>
-            <a:endParaRPr lang="ko-KR" altLang="en-US"/>
-          </a:p>
-        </p:txBody>
-      </p:sp>
-      <p:sp>
-        <p:nvSpPr>
-          <p:cNvPr id="5" name="자유형: 도형 4">
-            <a:extLst>
-              <a:ext uri="{FF2B5EF4-FFF2-40B4-BE49-F238E27FC236}">
-                <a16:creationId xmlns:a16="http://schemas.microsoft.com/office/drawing/2014/main" id="{A24E09F5-C8BD-501D-37A9-39114F526031}"/>
-              </a:ext>
-            </a:extLst>
-          </p:cNvPr>
-          <p:cNvSpPr/>
-          <p:nvPr/>
-        </p:nvSpPr>
-        <p:spPr>
-          <a:xfrm>
-            <a:off x="0" y="-104775"/>
-            <a:ext cx="4457700" cy="1655847"/>
-          </a:xfrm>
-          <a:custGeom>
-            <a:avLst/>
-            <a:gdLst>
-              <a:gd name="connsiteX0" fmla="*/ 0 w 4311941"/>
-              <a:gd name="connsiteY0" fmla="*/ 1283516 h 1327406"/>
-              <a:gd name="connsiteX1" fmla="*/ 1996580 w 4311941"/>
-              <a:gd name="connsiteY1" fmla="*/ 1266738 h 1327406"/>
-              <a:gd name="connsiteX2" fmla="*/ 3028426 w 4311941"/>
-              <a:gd name="connsiteY2" fmla="*/ 696286 h 1327406"/>
-              <a:gd name="connsiteX3" fmla="*/ 4009938 w 4311941"/>
-              <a:gd name="connsiteY3" fmla="*/ 352338 h 1327406"/>
-              <a:gd name="connsiteX4" fmla="*/ 4311941 w 4311941"/>
-              <a:gd name="connsiteY4" fmla="*/ 0 h 1327406"/>
-              <a:gd name="connsiteX0" fmla="*/ 0 w 4311941"/>
-              <a:gd name="connsiteY0" fmla="*/ 1283516 h 1314688"/>
-              <a:gd name="connsiteX1" fmla="*/ 1996580 w 4311941"/>
-              <a:gd name="connsiteY1" fmla="*/ 1266738 h 1314688"/>
-              <a:gd name="connsiteX2" fmla="*/ 3028426 w 4311941"/>
-              <a:gd name="connsiteY2" fmla="*/ 696286 h 1314688"/>
-              <a:gd name="connsiteX3" fmla="*/ 4009938 w 4311941"/>
-              <a:gd name="connsiteY3" fmla="*/ 352338 h 1314688"/>
-              <a:gd name="connsiteX4" fmla="*/ 4311941 w 4311941"/>
-              <a:gd name="connsiteY4" fmla="*/ 0 h 1314688"/>
-              <a:gd name="connsiteX0" fmla="*/ 0 w 4311941"/>
-              <a:gd name="connsiteY0" fmla="*/ 1283516 h 1294528"/>
-              <a:gd name="connsiteX1" fmla="*/ 1996580 w 4311941"/>
-              <a:gd name="connsiteY1" fmla="*/ 1233182 h 1294528"/>
-              <a:gd name="connsiteX2" fmla="*/ 3028426 w 4311941"/>
-              <a:gd name="connsiteY2" fmla="*/ 696286 h 1294528"/>
-              <a:gd name="connsiteX3" fmla="*/ 4009938 w 4311941"/>
-              <a:gd name="connsiteY3" fmla="*/ 352338 h 1294528"/>
-              <a:gd name="connsiteX4" fmla="*/ 4311941 w 4311941"/>
-              <a:gd name="connsiteY4" fmla="*/ 0 h 1294528"/>
-            </a:gdLst>
-            <a:ahLst/>
-            <a:cxnLst>
-              <a:cxn ang="0">
-                <a:pos x="connsiteX0" y="connsiteY0"/>
-              </a:cxn>
-              <a:cxn ang="0">
-                <a:pos x="connsiteX1" y="connsiteY1"/>
-              </a:cxn>
-              <a:cxn ang="0">
-                <a:pos x="connsiteX2" y="connsiteY2"/>
-              </a:cxn>
-              <a:cxn ang="0">
-                <a:pos x="connsiteX3" y="connsiteY3"/>
-              </a:cxn>
-              <a:cxn ang="0">
-                <a:pos x="connsiteX4" y="connsiteY4"/>
-              </a:cxn>
-            </a:cxnLst>
-            <a:rect l="l" t="t" r="r" b="b"/>
-            <a:pathLst>
-              <a:path w="4311941" h="1294528">
-                <a:moveTo>
-                  <a:pt x="0" y="1283516"/>
-                </a:moveTo>
-                <a:cubicBezTo>
-                  <a:pt x="729143" y="1282118"/>
-                  <a:pt x="1491842" y="1331054"/>
-                  <a:pt x="1996580" y="1233182"/>
-                </a:cubicBezTo>
-                <a:cubicBezTo>
-                  <a:pt x="2501318" y="1135310"/>
-                  <a:pt x="2692866" y="843093"/>
-                  <a:pt x="3028426" y="696286"/>
-                </a:cubicBezTo>
-                <a:cubicBezTo>
-                  <a:pt x="3363986" y="549479"/>
-                  <a:pt x="3796019" y="468386"/>
-                  <a:pt x="4009938" y="352338"/>
-                </a:cubicBezTo>
-                <a:cubicBezTo>
-                  <a:pt x="4223857" y="236290"/>
-                  <a:pt x="4263005" y="57325"/>
-                  <a:pt x="4311941" y="0"/>
-                </a:cubicBezTo>
-              </a:path>
-            </a:pathLst>
-          </a:custGeom>
-          <a:ln/>
-        </p:spPr>
-        <p:style>
-          <a:lnRef idx="1">
-            <a:schemeClr val="dk1"/>
-          </a:lnRef>
-          <a:fillRef idx="0">
-            <a:schemeClr val="dk1"/>
-          </a:fillRef>
-          <a:effectRef idx="0">
-            <a:schemeClr val="dk1"/>
-          </a:effectRef>
-          <a:fontRef idx="minor">
-            <a:schemeClr val="tx1"/>
-          </a:fontRef>
-        </p:style>
-        <p:txBody>
-          <a:bodyPr rtlCol="0" anchor="ctr"/>
-          <a:lstStyle/>
-          <a:p>
-            <a:pPr algn="ctr"/>
-            <a:endParaRPr lang="ko-KR" altLang="en-US"/>
-          </a:p>
-        </p:txBody>
-      </p:sp>
-    </p:spTree>
-    <p:extLst>
-      <p:ext uri="{BB962C8B-B14F-4D97-AF65-F5344CB8AC3E}">
-        <p14:creationId xmlns:p14="http://schemas.microsoft.com/office/powerpoint/2010/main" val="3132788510"/>
-      </p:ext>
-    </p:extLst>
-  </p:cSld>
-  <p:clrMapOvr>
-    <a:masterClrMapping/>
-  </p:clrMapOvr>
-</p:sld>
-</file>
-
-<file path=ppt/slides/slide8.xml><?xml version="1.0" encoding="utf-8"?>
-<p:sld xmlns:a="http://schemas.openxmlformats.org/drawingml/2006/main" xmlns:r="http://schemas.openxmlformats.org/officeDocument/2006/relationships" xmlns:p="http://schemas.openxmlformats.org/presentationml/2006/main">
-  <p:cSld>
-    <p:spTree>
-      <p:nvGrpSpPr>
-        <p:cNvPr id="1" name=""/>
-        <p:cNvGrpSpPr/>
-        <p:nvPr/>
-      </p:nvGrpSpPr>
-      <p:grpSpPr>
-        <a:xfrm>
-          <a:off x="0" y="0"/>
-          <a:ext cx="0" cy="0"/>
-          <a:chOff x="0" y="0"/>
-          <a:chExt cx="0" cy="0"/>
-        </a:xfrm>
-      </p:grpSpPr>
-      <p:sp>
-        <p:nvSpPr>
-          <p:cNvPr id="13" name="직사각형 12">
-            <a:extLst>
-              <a:ext uri="{FF2B5EF4-FFF2-40B4-BE49-F238E27FC236}">
-                <a16:creationId xmlns:a16="http://schemas.microsoft.com/office/drawing/2014/main" id="{CBE2EBA4-B7A7-CE94-6364-F07290FD5DB6}"/>
-              </a:ext>
-            </a:extLst>
-          </p:cNvPr>
-          <p:cNvSpPr/>
-          <p:nvPr/>
-        </p:nvSpPr>
-        <p:spPr>
-          <a:xfrm>
-            <a:off x="0" y="0"/>
-            <a:ext cx="12192000" cy="559837"/>
-          </a:xfrm>
-          <a:prstGeom prst="rect">
-            <a:avLst/>
-          </a:prstGeom>
-          <a:solidFill>
-            <a:schemeClr val="bg2"/>
-          </a:solidFill>
-          <a:ln>
-            <a:noFill/>
-          </a:ln>
-        </p:spPr>
-        <p:style>
-          <a:lnRef idx="2">
-            <a:schemeClr val="accent1">
-              <a:shade val="50000"/>
-            </a:schemeClr>
-          </a:lnRef>
-          <a:fillRef idx="1">
-            <a:schemeClr val="accent1"/>
-          </a:fillRef>
-          <a:effectRef idx="0">
-            <a:schemeClr val="accent1"/>
-          </a:effectRef>
-          <a:fontRef idx="minor">
-            <a:schemeClr val="lt1"/>
-          </a:fontRef>
-        </p:style>
-        <p:txBody>
-          <a:bodyPr rtlCol="0" anchor="ctr"/>
-          <a:lstStyle/>
-          <a:p>
-            <a:pPr algn="ctr"/>
-            <a:endParaRPr lang="ko-KR" altLang="en-US"/>
-          </a:p>
-        </p:txBody>
-      </p:sp>
-      <p:sp>
-        <p:nvSpPr>
-          <p:cNvPr id="4" name="직사각형 3">
-            <a:extLst>
-              <a:ext uri="{FF2B5EF4-FFF2-40B4-BE49-F238E27FC236}">
-                <a16:creationId xmlns:a16="http://schemas.microsoft.com/office/drawing/2014/main" id="{F55349CF-3223-CC91-09D1-C84B3F1651FA}"/>
-              </a:ext>
-            </a:extLst>
-          </p:cNvPr>
-          <p:cNvSpPr/>
-          <p:nvPr/>
-        </p:nvSpPr>
-        <p:spPr>
-          <a:xfrm>
-            <a:off x="0" y="6298163"/>
-            <a:ext cx="12192000" cy="559837"/>
-          </a:xfrm>
-          <a:prstGeom prst="rect">
-            <a:avLst/>
-          </a:prstGeom>
-          <a:solidFill>
-            <a:schemeClr val="bg2"/>
-          </a:solidFill>
-          <a:ln>
-            <a:noFill/>
-          </a:ln>
-        </p:spPr>
-        <p:style>
-          <a:lnRef idx="2">
-            <a:schemeClr val="accent1">
-              <a:shade val="50000"/>
-            </a:schemeClr>
-          </a:lnRef>
-          <a:fillRef idx="1">
-            <a:schemeClr val="accent1"/>
-          </a:fillRef>
-          <a:effectRef idx="0">
-            <a:schemeClr val="accent1"/>
-          </a:effectRef>
-          <a:fontRef idx="minor">
-            <a:schemeClr val="lt1"/>
-          </a:fontRef>
-        </p:style>
-        <p:txBody>
-          <a:bodyPr rtlCol="0" anchor="ctr"/>
-          <a:lstStyle/>
-          <a:p>
-            <a:pPr algn="ctr"/>
-            <a:endParaRPr lang="ko-KR" altLang="en-US"/>
-          </a:p>
-        </p:txBody>
-      </p:sp>
-      <p:sp>
-        <p:nvSpPr>
-          <p:cNvPr id="5" name="직사각형 4">
-            <a:extLst>
-              <a:ext uri="{FF2B5EF4-FFF2-40B4-BE49-F238E27FC236}">
-                <a16:creationId xmlns:a16="http://schemas.microsoft.com/office/drawing/2014/main" id="{802DB6B5-FAA6-79F1-98D9-6F23BE1E3C85}"/>
-              </a:ext>
-            </a:extLst>
-          </p:cNvPr>
-          <p:cNvSpPr/>
-          <p:nvPr/>
-        </p:nvSpPr>
-        <p:spPr>
-          <a:xfrm>
-            <a:off x="5350635" y="-9501"/>
-            <a:ext cx="1029020" cy="559837"/>
-          </a:xfrm>
-          <a:prstGeom prst="rect">
-            <a:avLst/>
-          </a:prstGeom>
-          <a:solidFill>
-            <a:schemeClr val="accent3"/>
-          </a:solidFill>
-          <a:ln>
-            <a:solidFill>
-              <a:schemeClr val="tx1"/>
-            </a:solidFill>
-          </a:ln>
-        </p:spPr>
-        <p:style>
-          <a:lnRef idx="2">
-            <a:schemeClr val="accent1">
-              <a:shade val="50000"/>
-            </a:schemeClr>
-          </a:lnRef>
-          <a:fillRef idx="1">
-            <a:schemeClr val="accent1"/>
-          </a:fillRef>
-          <a:effectRef idx="0">
-            <a:schemeClr val="accent1"/>
-          </a:effectRef>
-          <a:fontRef idx="minor">
-            <a:schemeClr val="lt1"/>
-          </a:fontRef>
-        </p:style>
-        <p:txBody>
-          <a:bodyPr rtlCol="0" anchor="ctr"/>
-          <a:lstStyle/>
-          <a:p>
-            <a:pPr algn="ctr"/>
-            <a:r>
-              <a:rPr lang="en-US" altLang="ko-KR"/>
-              <a:t>Mods</a:t>
-            </a:r>
-            <a:endParaRPr lang="ko-KR" altLang="en-US"/>
-          </a:p>
-        </p:txBody>
-      </p:sp>
-      <p:sp>
-        <p:nvSpPr>
-          <p:cNvPr id="7" name="직사각형 6">
-            <a:extLst>
-              <a:ext uri="{FF2B5EF4-FFF2-40B4-BE49-F238E27FC236}">
-                <a16:creationId xmlns:a16="http://schemas.microsoft.com/office/drawing/2014/main" id="{CA9BFD7C-DFD4-5312-0BE0-8928C36C4AEF}"/>
-              </a:ext>
-            </a:extLst>
-          </p:cNvPr>
-          <p:cNvSpPr/>
-          <p:nvPr/>
-        </p:nvSpPr>
-        <p:spPr>
-          <a:xfrm>
-            <a:off x="-8389" y="6298163"/>
-            <a:ext cx="1029020" cy="559837"/>
-          </a:xfrm>
-          <a:prstGeom prst="rect">
-            <a:avLst/>
-          </a:prstGeom>
-          <a:solidFill>
-            <a:schemeClr val="accent3"/>
-          </a:solidFill>
-          <a:ln>
-            <a:solidFill>
-              <a:schemeClr val="tx1"/>
-            </a:solidFill>
-          </a:ln>
-        </p:spPr>
-        <p:style>
-          <a:lnRef idx="2">
-            <a:schemeClr val="accent1">
-              <a:shade val="50000"/>
-            </a:schemeClr>
-          </a:lnRef>
-          <a:fillRef idx="1">
-            <a:schemeClr val="accent1"/>
-          </a:fillRef>
-          <a:effectRef idx="0">
-            <a:schemeClr val="accent1"/>
-          </a:effectRef>
-          <a:fontRef idx="minor">
-            <a:schemeClr val="lt1"/>
-          </a:fontRef>
-        </p:style>
-        <p:txBody>
-          <a:bodyPr rtlCol="0" anchor="ctr"/>
-          <a:lstStyle/>
-          <a:p>
-            <a:pPr algn="ctr"/>
-            <a:r>
-              <a:rPr lang="en-US" altLang="ko-KR"/>
-              <a:t>Back</a:t>
-            </a:r>
-            <a:endParaRPr lang="ko-KR" altLang="en-US"/>
-          </a:p>
-        </p:txBody>
-      </p:sp>
-      <p:sp>
-        <p:nvSpPr>
-          <p:cNvPr id="9" name="직사각형 8">
-            <a:extLst>
-              <a:ext uri="{FF2B5EF4-FFF2-40B4-BE49-F238E27FC236}">
-                <a16:creationId xmlns:a16="http://schemas.microsoft.com/office/drawing/2014/main" id="{9A572247-B942-D5F1-81FB-4EDFED2EC5AB}"/>
-              </a:ext>
-            </a:extLst>
-          </p:cNvPr>
-          <p:cNvSpPr/>
-          <p:nvPr/>
-        </p:nvSpPr>
-        <p:spPr>
-          <a:xfrm>
-            <a:off x="10276514" y="5771627"/>
-            <a:ext cx="1915486" cy="1095874"/>
-          </a:xfrm>
-          <a:prstGeom prst="rect">
-            <a:avLst/>
-          </a:prstGeom>
-          <a:solidFill>
-            <a:schemeClr val="accent3"/>
-          </a:solidFill>
-          <a:ln>
-            <a:solidFill>
-              <a:schemeClr val="tx1"/>
-            </a:solidFill>
-          </a:ln>
-        </p:spPr>
-        <p:style>
-          <a:lnRef idx="2">
-            <a:schemeClr val="accent1">
-              <a:shade val="50000"/>
-            </a:schemeClr>
-          </a:lnRef>
-          <a:fillRef idx="1">
-            <a:schemeClr val="accent1"/>
-          </a:fillRef>
-          <a:effectRef idx="0">
-            <a:schemeClr val="accent1"/>
-          </a:effectRef>
-          <a:fontRef idx="minor">
-            <a:schemeClr val="lt1"/>
-          </a:fontRef>
-        </p:style>
-        <p:txBody>
-          <a:bodyPr rtlCol="0" anchor="ctr"/>
-          <a:lstStyle/>
-          <a:p>
-            <a:pPr algn="ctr"/>
-            <a:r>
-              <a:rPr lang="en-US" altLang="ko-KR" sz="2400"/>
-              <a:t>Play</a:t>
-            </a:r>
-            <a:endParaRPr lang="ko-KR" altLang="en-US" sz="2400"/>
-          </a:p>
-        </p:txBody>
-      </p:sp>
-      <p:sp>
-        <p:nvSpPr>
-          <p:cNvPr id="11" name="직사각형 10">
-            <a:extLst>
-              <a:ext uri="{FF2B5EF4-FFF2-40B4-BE49-F238E27FC236}">
-                <a16:creationId xmlns:a16="http://schemas.microsoft.com/office/drawing/2014/main" id="{3AA847A8-0A67-2861-A011-7249D32DB7E4}"/>
-              </a:ext>
-            </a:extLst>
-          </p:cNvPr>
-          <p:cNvSpPr/>
-          <p:nvPr/>
-        </p:nvSpPr>
-        <p:spPr>
-          <a:xfrm>
-            <a:off x="2779922" y="6297050"/>
-            <a:ext cx="1029020" cy="559837"/>
-          </a:xfrm>
-          <a:prstGeom prst="rect">
-            <a:avLst/>
-          </a:prstGeom>
-          <a:solidFill>
-            <a:schemeClr val="accent3"/>
-          </a:solidFill>
-          <a:ln>
-            <a:solidFill>
-              <a:schemeClr val="tx1"/>
-            </a:solidFill>
-          </a:ln>
-        </p:spPr>
-        <p:style>
-          <a:lnRef idx="2">
-            <a:schemeClr val="accent1">
-              <a:shade val="50000"/>
-            </a:schemeClr>
-          </a:lnRef>
-          <a:fillRef idx="1">
-            <a:schemeClr val="accent1"/>
-          </a:fillRef>
-          <a:effectRef idx="0">
-            <a:schemeClr val="accent1"/>
-          </a:effectRef>
-          <a:fontRef idx="minor">
-            <a:schemeClr val="lt1"/>
-          </a:fontRef>
-        </p:style>
-        <p:txBody>
-          <a:bodyPr rtlCol="0" anchor="ctr"/>
-          <a:lstStyle/>
-          <a:p>
-            <a:pPr algn="ctr"/>
-            <a:r>
-              <a:rPr lang="en-US" altLang="ko-KR"/>
-              <a:t>Tags</a:t>
-            </a:r>
-            <a:br>
-              <a:rPr lang="en-US" altLang="ko-KR"/>
-            </a:br>
-            <a:r>
-              <a:rPr lang="en-US" altLang="ko-KR"/>
-              <a:t>Collect.</a:t>
-            </a:r>
-            <a:endParaRPr lang="ko-KR" altLang="en-US"/>
-          </a:p>
-        </p:txBody>
-      </p:sp>
-      <p:sp>
-        <p:nvSpPr>
-          <p:cNvPr id="15" name="직사각형 14">
-            <a:extLst>
-              <a:ext uri="{FF2B5EF4-FFF2-40B4-BE49-F238E27FC236}">
-                <a16:creationId xmlns:a16="http://schemas.microsoft.com/office/drawing/2014/main" id="{B8E9083D-7CF8-C4BE-9644-9BB7DC2E119B}"/>
-              </a:ext>
-            </a:extLst>
-          </p:cNvPr>
-          <p:cNvSpPr/>
-          <p:nvPr/>
-        </p:nvSpPr>
-        <p:spPr>
-          <a:xfrm>
-            <a:off x="3817331" y="6298163"/>
-            <a:ext cx="1029020" cy="559837"/>
-          </a:xfrm>
-          <a:prstGeom prst="rect">
-            <a:avLst/>
-          </a:prstGeom>
-          <a:solidFill>
-            <a:schemeClr val="accent3"/>
-          </a:solidFill>
-          <a:ln>
-            <a:solidFill>
-              <a:schemeClr val="tx1"/>
-            </a:solidFill>
-          </a:ln>
-        </p:spPr>
-        <p:style>
-          <a:lnRef idx="2">
-            <a:schemeClr val="accent1">
-              <a:shade val="50000"/>
-            </a:schemeClr>
-          </a:lnRef>
-          <a:fillRef idx="1">
-            <a:schemeClr val="accent1"/>
-          </a:fillRef>
-          <a:effectRef idx="0">
-            <a:schemeClr val="accent1"/>
-          </a:effectRef>
-          <a:fontRef idx="minor">
-            <a:schemeClr val="lt1"/>
-          </a:fontRef>
-        </p:style>
-        <p:txBody>
-          <a:bodyPr rtlCol="0" anchor="ctr"/>
-          <a:lstStyle/>
-          <a:p>
-            <a:pPr algn="ctr"/>
-            <a:r>
-              <a:rPr lang="en-US" altLang="ko-KR"/>
-              <a:t>Editor</a:t>
-            </a:r>
-            <a:endParaRPr lang="ko-KR" altLang="en-US"/>
-          </a:p>
-        </p:txBody>
-      </p:sp>
-      <p:sp>
-        <p:nvSpPr>
-          <p:cNvPr id="19" name="직사각형 18">
-            <a:extLst>
-              <a:ext uri="{FF2B5EF4-FFF2-40B4-BE49-F238E27FC236}">
-                <a16:creationId xmlns:a16="http://schemas.microsoft.com/office/drawing/2014/main" id="{36B73C17-F75D-DE64-730C-2FD219EEAB3A}"/>
-              </a:ext>
-            </a:extLst>
-          </p:cNvPr>
-          <p:cNvSpPr/>
-          <p:nvPr/>
-        </p:nvSpPr>
-        <p:spPr>
-          <a:xfrm>
-            <a:off x="7416188" y="0"/>
-            <a:ext cx="712694" cy="560950"/>
-          </a:xfrm>
-          <a:prstGeom prst="rect">
-            <a:avLst/>
-          </a:prstGeom>
-          <a:solidFill>
-            <a:schemeClr val="accent3"/>
-          </a:solidFill>
-          <a:ln>
-            <a:solidFill>
-              <a:schemeClr val="tx1"/>
-            </a:solidFill>
-          </a:ln>
-        </p:spPr>
-        <p:style>
-          <a:lnRef idx="2">
-            <a:schemeClr val="accent1">
-              <a:shade val="50000"/>
-            </a:schemeClr>
-          </a:lnRef>
-          <a:fillRef idx="1">
-            <a:schemeClr val="accent1"/>
-          </a:fillRef>
-          <a:effectRef idx="0">
-            <a:schemeClr val="accent1"/>
-          </a:effectRef>
-          <a:fontRef idx="minor">
-            <a:schemeClr val="lt1"/>
-          </a:fontRef>
-        </p:style>
-        <p:txBody>
-          <a:bodyPr rtlCol="0" anchor="ctr"/>
-          <a:lstStyle/>
-          <a:p>
-            <a:pPr algn="ctr"/>
-            <a:r>
-              <a:rPr lang="en-US" altLang="ko-KR" sz="1600"/>
-              <a:t>Img</a:t>
-            </a:r>
-            <a:endParaRPr lang="ko-KR" altLang="en-US" sz="1600"/>
-          </a:p>
-        </p:txBody>
-      </p:sp>
-      <p:sp>
-        <p:nvSpPr>
-          <p:cNvPr id="21" name="직사각형 20">
-            <a:extLst>
-              <a:ext uri="{FF2B5EF4-FFF2-40B4-BE49-F238E27FC236}">
-                <a16:creationId xmlns:a16="http://schemas.microsoft.com/office/drawing/2014/main" id="{783120F7-80E0-5C78-5FC7-A8E41948E1F6}"/>
-              </a:ext>
-            </a:extLst>
-          </p:cNvPr>
-          <p:cNvSpPr/>
-          <p:nvPr/>
-        </p:nvSpPr>
-        <p:spPr>
-          <a:xfrm>
-            <a:off x="8147370" y="-1113"/>
-            <a:ext cx="2039510" cy="559837"/>
-          </a:xfrm>
-          <a:prstGeom prst="rect">
-            <a:avLst/>
-          </a:prstGeom>
-          <a:solidFill>
-            <a:schemeClr val="accent3"/>
-          </a:solidFill>
-          <a:ln>
-            <a:solidFill>
-              <a:schemeClr val="tx1"/>
-            </a:solidFill>
-          </a:ln>
-        </p:spPr>
-        <p:style>
-          <a:lnRef idx="2">
-            <a:schemeClr val="accent1">
-              <a:shade val="50000"/>
-            </a:schemeClr>
-          </a:lnRef>
-          <a:fillRef idx="1">
-            <a:schemeClr val="accent1"/>
-          </a:fillRef>
-          <a:effectRef idx="0">
-            <a:schemeClr val="accent1"/>
-          </a:effectRef>
-          <a:fontRef idx="minor">
-            <a:schemeClr val="lt1"/>
-          </a:fontRef>
-        </p:style>
-        <p:txBody>
-          <a:bodyPr rtlCol="0" anchor="ctr"/>
-          <a:lstStyle/>
-          <a:p>
-            <a:pPr algn="ctr"/>
-            <a:r>
-              <a:rPr lang="en-US" altLang="ko-KR" dirty="0"/>
-              <a:t>User</a:t>
-            </a:r>
-            <a:endParaRPr lang="ko-KR" altLang="en-US" dirty="0"/>
-          </a:p>
-        </p:txBody>
-      </p:sp>
-      <p:sp>
-        <p:nvSpPr>
-          <p:cNvPr id="22" name="직사각형 21">
-            <a:extLst>
-              <a:ext uri="{FF2B5EF4-FFF2-40B4-BE49-F238E27FC236}">
-                <a16:creationId xmlns:a16="http://schemas.microsoft.com/office/drawing/2014/main" id="{106803AF-5303-1F9A-F988-48832606EC10}"/>
-              </a:ext>
-            </a:extLst>
-          </p:cNvPr>
-          <p:cNvSpPr/>
-          <p:nvPr/>
-        </p:nvSpPr>
-        <p:spPr>
-          <a:xfrm>
-            <a:off x="-8389" y="-9501"/>
-            <a:ext cx="4330005" cy="2621903"/>
-          </a:xfrm>
-          <a:prstGeom prst="rect">
-            <a:avLst/>
-          </a:prstGeom>
-        </p:spPr>
-        <p:style>
-          <a:lnRef idx="2">
-            <a:schemeClr val="accent4">
-              <a:shade val="50000"/>
-            </a:schemeClr>
-          </a:lnRef>
-          <a:fillRef idx="1">
-            <a:schemeClr val="accent4"/>
-          </a:fillRef>
-          <a:effectRef idx="0">
-            <a:schemeClr val="accent4"/>
-          </a:effectRef>
-          <a:fontRef idx="minor">
-            <a:schemeClr val="lt1"/>
-          </a:fontRef>
-        </p:style>
-        <p:txBody>
-          <a:bodyPr rtlCol="0" anchor="ctr"/>
-          <a:lstStyle/>
-          <a:p>
-            <a:pPr algn="ctr"/>
-            <a:r>
-              <a:rPr lang="en-US" altLang="ko-KR"/>
-              <a:t>Chart info</a:t>
-            </a:r>
-            <a:endParaRPr lang="ko-KR" altLang="en-US"/>
-          </a:p>
-        </p:txBody>
-      </p:sp>
-      <p:sp>
-        <p:nvSpPr>
-          <p:cNvPr id="24" name="직사각형 23">
-            <a:extLst>
-              <a:ext uri="{FF2B5EF4-FFF2-40B4-BE49-F238E27FC236}">
-                <a16:creationId xmlns:a16="http://schemas.microsoft.com/office/drawing/2014/main" id="{BE994B68-DC4A-0B08-4216-55DF0BCAD89D}"/>
-              </a:ext>
-            </a:extLst>
-          </p:cNvPr>
-          <p:cNvSpPr/>
-          <p:nvPr/>
-        </p:nvSpPr>
-        <p:spPr>
-          <a:xfrm>
-            <a:off x="-8390" y="2596393"/>
-            <a:ext cx="4330005" cy="3691156"/>
-          </a:xfrm>
-          <a:prstGeom prst="rect">
-            <a:avLst/>
-          </a:prstGeom>
-        </p:spPr>
-        <p:style>
-          <a:lnRef idx="2">
-            <a:schemeClr val="accent6">
-              <a:shade val="50000"/>
-            </a:schemeClr>
-          </a:lnRef>
-          <a:fillRef idx="1">
-            <a:schemeClr val="accent6"/>
-          </a:fillRef>
-          <a:effectRef idx="0">
-            <a:schemeClr val="accent6"/>
-          </a:effectRef>
-          <a:fontRef idx="minor">
-            <a:schemeClr val="lt1"/>
-          </a:fontRef>
-        </p:style>
-        <p:txBody>
-          <a:bodyPr rtlCol="0" anchor="ctr"/>
-          <a:lstStyle/>
-          <a:p>
-            <a:pPr algn="ctr"/>
-            <a:r>
-              <a:rPr lang="en-US" altLang="ko-KR" dirty="0"/>
-              <a:t>Ranking</a:t>
-            </a:r>
-          </a:p>
-          <a:p>
-            <a:pPr algn="ctr"/>
-            <a:r>
-              <a:rPr lang="en-US" altLang="ko-KR" dirty="0"/>
-              <a:t>Player list when at lobby</a:t>
-            </a:r>
-            <a:endParaRPr lang="ko-KR" altLang="en-US" dirty="0"/>
-          </a:p>
-        </p:txBody>
-      </p:sp>
-      <p:sp>
-        <p:nvSpPr>
-          <p:cNvPr id="26" name="직사각형 25">
-            <a:extLst>
-              <a:ext uri="{FF2B5EF4-FFF2-40B4-BE49-F238E27FC236}">
-                <a16:creationId xmlns:a16="http://schemas.microsoft.com/office/drawing/2014/main" id="{90367FBA-6188-A74D-C15D-63715A60AFD5}"/>
-              </a:ext>
-            </a:extLst>
-          </p:cNvPr>
-          <p:cNvSpPr/>
-          <p:nvPr/>
-        </p:nvSpPr>
-        <p:spPr>
-          <a:xfrm>
-            <a:off x="6370390" y="-9501"/>
-            <a:ext cx="1029020" cy="559837"/>
-          </a:xfrm>
-          <a:prstGeom prst="rect">
-            <a:avLst/>
-          </a:prstGeom>
-          <a:solidFill>
-            <a:schemeClr val="accent3"/>
-          </a:solidFill>
-          <a:ln>
-            <a:solidFill>
-              <a:schemeClr val="tx1"/>
-            </a:solidFill>
-          </a:ln>
-        </p:spPr>
-        <p:style>
-          <a:lnRef idx="2">
-            <a:schemeClr val="accent1">
-              <a:shade val="50000"/>
-            </a:schemeClr>
-          </a:lnRef>
-          <a:fillRef idx="1">
-            <a:schemeClr val="accent1"/>
-          </a:fillRef>
-          <a:effectRef idx="0">
-            <a:schemeClr val="accent1"/>
-          </a:effectRef>
-          <a:fontRef idx="minor">
-            <a:schemeClr val="lt1"/>
-          </a:fontRef>
-        </p:style>
-        <p:txBody>
-          <a:bodyPr rtlCol="0" anchor="ctr"/>
-          <a:lstStyle/>
-          <a:p>
-            <a:pPr algn="ctr"/>
-            <a:r>
-              <a:rPr lang="en-US" altLang="ko-KR"/>
-              <a:t>Sort</a:t>
-            </a:r>
-            <a:endParaRPr lang="ko-KR" altLang="en-US"/>
-          </a:p>
-        </p:txBody>
-      </p:sp>
-      <p:sp>
-        <p:nvSpPr>
-          <p:cNvPr id="28" name="직사각형 27">
-            <a:extLst>
-              <a:ext uri="{FF2B5EF4-FFF2-40B4-BE49-F238E27FC236}">
-                <a16:creationId xmlns:a16="http://schemas.microsoft.com/office/drawing/2014/main" id="{B00EE38B-799F-650C-81FD-141EA904738F}"/>
-              </a:ext>
-            </a:extLst>
-          </p:cNvPr>
-          <p:cNvSpPr/>
-          <p:nvPr/>
-        </p:nvSpPr>
-        <p:spPr>
-          <a:xfrm>
-            <a:off x="4321615" y="-19001"/>
-            <a:ext cx="1029020" cy="559837"/>
-          </a:xfrm>
-          <a:prstGeom prst="rect">
-            <a:avLst/>
-          </a:prstGeom>
-          <a:solidFill>
-            <a:schemeClr val="accent3"/>
-          </a:solidFill>
-          <a:ln>
-            <a:solidFill>
-              <a:schemeClr val="tx1"/>
-            </a:solidFill>
-          </a:ln>
-        </p:spPr>
-        <p:style>
-          <a:lnRef idx="2">
-            <a:schemeClr val="accent1">
-              <a:shade val="50000"/>
-            </a:schemeClr>
-          </a:lnRef>
-          <a:fillRef idx="1">
-            <a:schemeClr val="accent1"/>
-          </a:fillRef>
-          <a:effectRef idx="0">
-            <a:schemeClr val="accent1"/>
-          </a:effectRef>
-          <a:fontRef idx="minor">
-            <a:schemeClr val="lt1"/>
-          </a:fontRef>
-        </p:style>
-        <p:txBody>
-          <a:bodyPr rtlCol="0" anchor="ctr"/>
-          <a:lstStyle/>
-          <a:p>
-            <a:pPr algn="ctr"/>
-            <a:r>
-              <a:rPr lang="en-US" altLang="ko-KR"/>
-              <a:t>Mode</a:t>
-            </a:r>
-            <a:endParaRPr lang="ko-KR" altLang="en-US"/>
-          </a:p>
-        </p:txBody>
-      </p:sp>
-      <p:sp>
-        <p:nvSpPr>
-          <p:cNvPr id="32" name="직사각형 31">
-            <a:extLst>
-              <a:ext uri="{FF2B5EF4-FFF2-40B4-BE49-F238E27FC236}">
-                <a16:creationId xmlns:a16="http://schemas.microsoft.com/office/drawing/2014/main" id="{0D283D03-E6F9-FDC9-157B-7BB76EFFD791}"/>
-              </a:ext>
-            </a:extLst>
-          </p:cNvPr>
-          <p:cNvSpPr/>
-          <p:nvPr/>
-        </p:nvSpPr>
-        <p:spPr>
-          <a:xfrm>
-            <a:off x="7416188" y="578837"/>
-            <a:ext cx="4784201" cy="279919"/>
-          </a:xfrm>
-          <a:prstGeom prst="rect">
-            <a:avLst/>
-          </a:prstGeom>
-          <a:ln/>
-        </p:spPr>
-        <p:style>
-          <a:lnRef idx="3">
-            <a:schemeClr val="lt1"/>
-          </a:lnRef>
-          <a:fillRef idx="1">
-            <a:schemeClr val="accent1"/>
-          </a:fillRef>
-          <a:effectRef idx="1">
-            <a:schemeClr val="accent1"/>
-          </a:effectRef>
-          <a:fontRef idx="minor">
-            <a:schemeClr val="lt1"/>
-          </a:fontRef>
-        </p:style>
-        <p:txBody>
-          <a:bodyPr rtlCol="0" anchor="ctr"/>
-          <a:lstStyle/>
-          <a:p>
-            <a:pPr algn="ctr"/>
-            <a:r>
-              <a:rPr lang="en-US" altLang="ko-KR"/>
-              <a:t>Search</a:t>
-            </a:r>
-            <a:endParaRPr lang="ko-KR" altLang="en-US"/>
-          </a:p>
-        </p:txBody>
-      </p:sp>
-      <p:sp>
-        <p:nvSpPr>
-          <p:cNvPr id="34" name="직사각형 33">
-            <a:extLst>
-              <a:ext uri="{FF2B5EF4-FFF2-40B4-BE49-F238E27FC236}">
-                <a16:creationId xmlns:a16="http://schemas.microsoft.com/office/drawing/2014/main" id="{588E1E37-2295-3D1E-EFFA-F3242066BF1F}"/>
-              </a:ext>
-            </a:extLst>
-          </p:cNvPr>
-          <p:cNvSpPr/>
-          <p:nvPr/>
-        </p:nvSpPr>
-        <p:spPr>
-          <a:xfrm>
-            <a:off x="4836125" y="6298163"/>
-            <a:ext cx="1029020" cy="559837"/>
-          </a:xfrm>
-          <a:prstGeom prst="rect">
-            <a:avLst/>
-          </a:prstGeom>
-          <a:solidFill>
-            <a:schemeClr val="accent3"/>
-          </a:solidFill>
-          <a:ln>
-            <a:solidFill>
-              <a:schemeClr val="tx1"/>
-            </a:solidFill>
-          </a:ln>
-        </p:spPr>
-        <p:style>
-          <a:lnRef idx="2">
-            <a:schemeClr val="accent1">
-              <a:shade val="50000"/>
-            </a:schemeClr>
-          </a:lnRef>
-          <a:fillRef idx="1">
-            <a:schemeClr val="accent1"/>
-          </a:fillRef>
-          <a:effectRef idx="0">
-            <a:schemeClr val="accent1"/>
-          </a:effectRef>
-          <a:fontRef idx="minor">
-            <a:schemeClr val="lt1"/>
-          </a:fontRef>
-        </p:style>
-        <p:txBody>
-          <a:bodyPr rtlCol="0" anchor="ctr"/>
-          <a:lstStyle/>
-          <a:p>
-            <a:pPr algn="ctr"/>
-            <a:r>
-              <a:rPr lang="en-US" altLang="ko-KR"/>
-              <a:t>Options</a:t>
-            </a:r>
-            <a:endParaRPr lang="ko-KR" altLang="en-US"/>
-          </a:p>
-        </p:txBody>
-      </p:sp>
-      <p:sp>
-        <p:nvSpPr>
-          <p:cNvPr id="3" name="직사각형 2">
-            <a:extLst>
-              <a:ext uri="{FF2B5EF4-FFF2-40B4-BE49-F238E27FC236}">
-                <a16:creationId xmlns:a16="http://schemas.microsoft.com/office/drawing/2014/main" id="{DCB1CA92-C1A3-3222-BF0B-A42BAD23AF3F}"/>
-              </a:ext>
-            </a:extLst>
-          </p:cNvPr>
-          <p:cNvSpPr/>
-          <p:nvPr/>
-        </p:nvSpPr>
-        <p:spPr>
-          <a:xfrm>
-            <a:off x="10186880" y="-9501"/>
-            <a:ext cx="2039510" cy="559837"/>
-          </a:xfrm>
-          <a:prstGeom prst="rect">
-            <a:avLst/>
-          </a:prstGeom>
-          <a:solidFill>
-            <a:schemeClr val="accent3"/>
-          </a:solidFill>
-          <a:ln>
-            <a:solidFill>
-              <a:schemeClr val="tx1"/>
-            </a:solidFill>
-          </a:ln>
-        </p:spPr>
-        <p:style>
-          <a:lnRef idx="2">
-            <a:schemeClr val="accent1">
-              <a:shade val="50000"/>
-            </a:schemeClr>
-          </a:lnRef>
-          <a:fillRef idx="1">
-            <a:schemeClr val="accent1"/>
-          </a:fillRef>
-          <a:effectRef idx="0">
-            <a:schemeClr val="accent1"/>
-          </a:effectRef>
-          <a:fontRef idx="minor">
-            <a:schemeClr val="lt1"/>
-          </a:fontRef>
-        </p:style>
-        <p:txBody>
-          <a:bodyPr rtlCol="0" anchor="ctr"/>
-          <a:lstStyle/>
-          <a:p>
-            <a:pPr algn="ctr"/>
-            <a:r>
-              <a:rPr lang="en-US" altLang="ko-KR"/>
-              <a:t>Statistics</a:t>
-            </a:r>
-            <a:endParaRPr lang="ko-KR" altLang="en-US" dirty="0"/>
-          </a:p>
-        </p:txBody>
-      </p:sp>
-    </p:spTree>
-    <p:extLst>
-      <p:ext uri="{BB962C8B-B14F-4D97-AF65-F5344CB8AC3E}">
-        <p14:creationId xmlns:p14="http://schemas.microsoft.com/office/powerpoint/2010/main" val="3371721876"/>
-      </p:ext>
-    </p:extLst>
-  </p:cSld>
-  <p:clrMapOvr>
-    <a:masterClrMapping/>
-  </p:clrMapOvr>
-</p:sld>
-</file>
-
-<file path=ppt/slides/slide9.xml><?xml version="1.0" encoding="utf-8"?>
-<p:sld xmlns:a="http://schemas.openxmlformats.org/drawingml/2006/main" xmlns:r="http://schemas.openxmlformats.org/officeDocument/2006/relationships" xmlns:p="http://schemas.openxmlformats.org/presentationml/2006/main">
-  <p:cSld>
-    <p:spTree>
-      <p:nvGrpSpPr>
-        <p:cNvPr id="1" name=""/>
-        <p:cNvGrpSpPr/>
-        <p:nvPr/>
-      </p:nvGrpSpPr>
-      <p:grpSpPr>
-        <a:xfrm>
-          <a:off x="0" y="0"/>
-          <a:ext cx="0" cy="0"/>
-          <a:chOff x="0" y="0"/>
-          <a:chExt cx="0" cy="0"/>
-        </a:xfrm>
-      </p:grpSpPr>
-      <p:pic>
-        <p:nvPicPr>
-          <p:cNvPr id="3" name="그래픽 2">
-            <a:extLst>
-              <a:ext uri="{FF2B5EF4-FFF2-40B4-BE49-F238E27FC236}">
-                <a16:creationId xmlns:a16="http://schemas.microsoft.com/office/drawing/2014/main" id="{6EF15F76-81F4-63B1-B380-56118D68C9C4}"/>
-              </a:ext>
-            </a:extLst>
-          </p:cNvPr>
-          <p:cNvPicPr>
-            <a:picLocks noChangeAspect="1"/>
-          </p:cNvPicPr>
-          <p:nvPr/>
-        </p:nvPicPr>
-        <p:blipFill>
-          <a:blip r:embed="rId2">
-            <a:extLst>
-              <a:ext uri="{28A0092B-C50C-407E-A947-70E740481C1C}">
-                <a14:useLocalDpi xmlns:a14="http://schemas.microsoft.com/office/drawing/2010/main" val="0"/>
-              </a:ext>
-              <a:ext uri="{96DAC541-7B7A-43D3-8B79-37D633B846F1}">
-                <asvg:svgBlip xmlns:asvg="http://schemas.microsoft.com/office/drawing/2016/SVG/main" r:embed="rId3"/>
-              </a:ext>
-            </a:extLst>
-          </a:blip>
-          <a:stretch>
-            <a:fillRect/>
-          </a:stretch>
-        </p:blipFill>
-        <p:spPr>
-          <a:xfrm>
-            <a:off x="3020267" y="0"/>
-            <a:ext cx="6151465" cy="6858000"/>
-          </a:xfrm>
-          <a:prstGeom prst="rect">
-            <a:avLst/>
-          </a:prstGeom>
-        </p:spPr>
-      </p:pic>
-    </p:spTree>
-    <p:extLst>
-      <p:ext uri="{BB962C8B-B14F-4D97-AF65-F5344CB8AC3E}">
-        <p14:creationId xmlns:p14="http://schemas.microsoft.com/office/powerpoint/2010/main" val="1458503390"/>
       </p:ext>
     </p:extLst>
   </p:cSld>

</xml_diff>